<commit_message>
qp imlemented, but solver fails when too agressive near boundary
</commit_message>
<xml_diff>
--- a/poster_template.pptx
+++ b/poster_template.pptx
@@ -7,13 +7,14 @@
     <p:sldMasterId id="2147483705" r:id="rId3"/>
   </p:sldMasterIdLst>
   <p:notesMasterIdLst>
-    <p:notesMasterId r:id="rId5"/>
+    <p:notesMasterId r:id="rId6"/>
   </p:notesMasterIdLst>
   <p:handoutMasterIdLst>
-    <p:handoutMasterId r:id="rId6"/>
+    <p:handoutMasterId r:id="rId7"/>
   </p:handoutMasterIdLst>
   <p:sldIdLst>
     <p:sldId id="550145314" r:id="rId4"/>
+    <p:sldId id="550145315" r:id="rId5"/>
   </p:sldIdLst>
   <p:sldSz cx="27432000" cy="21945600"/>
   <p:notesSz cx="6858000" cy="9144000"/>
@@ -258,7 +259,7 @@
           <a:p>
             <a:fld id="{E394459D-4ED9-42C0-9886-E4318E66D659}" type="datetimeFigureOut">
               <a:rPr lang="en-US" smtClean="0"/>
-              <a:t>5/15/24</a:t>
+              <a:t>6/3/25</a:t>
             </a:fld>
             <a:endParaRPr lang="en-US"/>
           </a:p>
@@ -336,7 +337,7 @@
           <a:p>
             <a:fld id="{920A3890-E2AF-42F7-93E9-CC3045D41984}" type="slidenum">
               <a:rPr lang="en-US" smtClean="0"/>
-              <a:t>‹#›</a:t>
+              <a:t>‹n°›</a:t>
             </a:fld>
             <a:endParaRPr lang="en-US"/>
           </a:p>
@@ -435,7 +436,7 @@
           <a:p>
             <a:fld id="{96B0D4E3-4240-D348-8158-8C8512241F01}" type="datetimeFigureOut">
               <a:rPr lang="en-US" smtClean="0"/>
-              <a:t>5/15/24</a:t>
+              <a:t>6/3/25</a:t>
             </a:fld>
             <a:endParaRPr lang="en-US"/>
           </a:p>
@@ -593,7 +594,7 @@
           <a:p>
             <a:fld id="{2C9EEC63-ADBB-0446-8D74-4B0083EE59B6}" type="slidenum">
               <a:rPr lang="en-US" smtClean="0"/>
-              <a:t>‹#›</a:t>
+              <a:t>‹n°›</a:t>
             </a:fld>
             <a:endParaRPr lang="en-US"/>
           </a:p>
@@ -862,6 +863,90 @@
 </p:notes>
 </file>
 
+<file path=ppt/notesSlides/notesSlide2.xml><?xml version="1.0" encoding="utf-8"?>
+<p:notes xmlns:a="http://schemas.openxmlformats.org/drawingml/2006/main" xmlns:r="http://schemas.openxmlformats.org/officeDocument/2006/relationships" xmlns:p="http://schemas.openxmlformats.org/presentationml/2006/main">
+  <p:cSld>
+    <p:spTree>
+      <p:nvGrpSpPr>
+        <p:cNvPr id="1" name=""/>
+        <p:cNvGrpSpPr/>
+        <p:nvPr/>
+      </p:nvGrpSpPr>
+      <p:grpSpPr>
+        <a:xfrm>
+          <a:off x="0" y="0"/>
+          <a:ext cx="0" cy="0"/>
+          <a:chOff x="0" y="0"/>
+          <a:chExt cx="0" cy="0"/>
+        </a:xfrm>
+      </p:grpSpPr>
+      <p:sp>
+        <p:nvSpPr>
+          <p:cNvPr id="2" name="Espace réservé de l'image de diapositive 1"/>
+          <p:cNvSpPr>
+            <a:spLocks noGrp="1" noRot="1" noChangeAspect="1"/>
+          </p:cNvSpPr>
+          <p:nvPr>
+            <p:ph type="sldImg"/>
+          </p:nvPr>
+        </p:nvSpPr>
+        <p:spPr/>
+      </p:sp>
+      <p:sp>
+        <p:nvSpPr>
+          <p:cNvPr id="3" name="Espace réservé des notes 2"/>
+          <p:cNvSpPr>
+            <a:spLocks noGrp="1"/>
+          </p:cNvSpPr>
+          <p:nvPr>
+            <p:ph type="body" idx="1"/>
+          </p:nvPr>
+        </p:nvSpPr>
+        <p:spPr/>
+        <p:txBody>
+          <a:bodyPr/>
+          <a:lstStyle/>
+          <a:p>
+            <a:endParaRPr lang="fr-NL"/>
+          </a:p>
+        </p:txBody>
+      </p:sp>
+      <p:sp>
+        <p:nvSpPr>
+          <p:cNvPr id="4" name="Espace réservé du numéro de diapositive 3"/>
+          <p:cNvSpPr>
+            <a:spLocks noGrp="1"/>
+          </p:cNvSpPr>
+          <p:nvPr>
+            <p:ph type="sldNum" sz="quarter" idx="5"/>
+          </p:nvPr>
+        </p:nvSpPr>
+        <p:spPr/>
+        <p:txBody>
+          <a:bodyPr/>
+          <a:lstStyle/>
+          <a:p>
+            <a:fld id="{2C9EEC63-ADBB-0446-8D74-4B0083EE59B6}" type="slidenum">
+              <a:rPr lang="en-US" smtClean="0"/>
+              <a:t>2</a:t>
+            </a:fld>
+            <a:endParaRPr lang="en-US"/>
+          </a:p>
+        </p:txBody>
+      </p:sp>
+    </p:spTree>
+    <p:extLst>
+      <p:ext uri="{BB962C8B-B14F-4D97-AF65-F5344CB8AC3E}">
+        <p14:creationId xmlns:p14="http://schemas.microsoft.com/office/powerpoint/2010/main" val="549679897"/>
+      </p:ext>
+    </p:extLst>
+  </p:cSld>
+  <p:clrMapOvr>
+    <a:masterClrMapping/>
+  </p:clrMapOvr>
+</p:notes>
+</file>
+
 <file path=ppt/slideLayouts/slideLayout1.xml><?xml version="1.0" encoding="utf-8"?>
 <p:sldLayout xmlns:a="http://schemas.openxmlformats.org/drawingml/2006/main" xmlns:r="http://schemas.openxmlformats.org/officeDocument/2006/relationships" xmlns:p="http://schemas.openxmlformats.org/presentationml/2006/main" preserve="1" userDrawn="1">
   <p:cSld name="Custom Layout">
@@ -2379,7 +2464,7 @@
           <a:p>
             <a:fld id="{0C5720C1-DBBE-464B-BDF3-8863F8043B23}" type="slidenum">
               <a:rPr lang="en-US" smtClean="0"/>
-              <a:t>‹#›</a:t>
+              <a:t>‹n°›</a:t>
             </a:fld>
             <a:endParaRPr lang="en-US" dirty="0"/>
           </a:p>
@@ -2690,7 +2775,7 @@
           <a:p>
             <a:fld id="{0C5720C1-DBBE-464B-BDF3-8863F8043B23}" type="slidenum">
               <a:rPr lang="en-US" smtClean="0"/>
-              <a:t>‹#›</a:t>
+              <a:t>‹n°›</a:t>
             </a:fld>
             <a:endParaRPr lang="en-US" dirty="0"/>
           </a:p>
@@ -2911,7 +2996,7 @@
           <a:p>
             <a:fld id="{0C5720C1-DBBE-464B-BDF3-8863F8043B23}" type="slidenum">
               <a:rPr lang="en-US" smtClean="0"/>
-              <a:t>‹#›</a:t>
+              <a:t>‹n°›</a:t>
             </a:fld>
             <a:endParaRPr lang="en-US" dirty="0"/>
           </a:p>
@@ -3142,7 +3227,7 @@
           <a:p>
             <a:fld id="{0C5720C1-DBBE-464B-BDF3-8863F8043B23}" type="slidenum">
               <a:rPr lang="en-US" smtClean="0"/>
-              <a:t>‹#›</a:t>
+              <a:t>‹n°›</a:t>
             </a:fld>
             <a:endParaRPr lang="en-US" dirty="0"/>
           </a:p>
@@ -4036,7 +4121,7 @@
           <a:p>
             <a:fld id="{0C5720C1-DBBE-464B-BDF3-8863F8043B23}" type="slidenum">
               <a:rPr lang="en-US" smtClean="0"/>
-              <a:t>‹#›</a:t>
+              <a:t>‹n°›</a:t>
             </a:fld>
             <a:endParaRPr lang="en-US" dirty="0"/>
           </a:p>
@@ -4177,7 +4262,7 @@
           <a:p>
             <a:fld id="{48F63A3B-78C7-47BE-AE5E-E10140E04643}" type="slidenum">
               <a:rPr lang="en-US" smtClean="0"/>
-              <a:t>‹#›</a:t>
+              <a:t>‹n°›</a:t>
             </a:fld>
             <a:endParaRPr lang="en-US" dirty="0"/>
           </a:p>
@@ -4896,7 +4981,7 @@
           <a:p>
             <a:fld id="{0C5720C1-DBBE-464B-BDF3-8863F8043B23}" type="slidenum">
               <a:rPr lang="en-US" smtClean="0"/>
-              <a:t>‹#›</a:t>
+              <a:t>‹n°›</a:t>
             </a:fld>
             <a:endParaRPr lang="en-US" dirty="0"/>
           </a:p>
@@ -5331,7 +5416,7 @@
           <a:p>
             <a:fld id="{0C5720C1-DBBE-464B-BDF3-8863F8043B23}" type="slidenum">
               <a:rPr lang="en-US" smtClean="0"/>
-              <a:t>‹#›</a:t>
+              <a:t>‹n°›</a:t>
             </a:fld>
             <a:endParaRPr lang="en-US" dirty="0"/>
           </a:p>
@@ -5495,7 +5580,7 @@
           <a:p>
             <a:fld id="{0C5720C1-DBBE-464B-BDF3-8863F8043B23}" type="slidenum">
               <a:rPr lang="en-US" smtClean="0"/>
-              <a:t>‹#›</a:t>
+              <a:t>‹n°›</a:t>
             </a:fld>
             <a:endParaRPr lang="en-US" dirty="0"/>
           </a:p>
@@ -5631,7 +5716,7 @@
           <a:p>
             <a:fld id="{0C5720C1-DBBE-464B-BDF3-8863F8043B23}" type="slidenum">
               <a:rPr lang="en-US" smtClean="0"/>
-              <a:t>‹#›</a:t>
+              <a:t>‹n°›</a:t>
             </a:fld>
             <a:endParaRPr lang="en-US" dirty="0"/>
           </a:p>
@@ -5965,7 +6050,7 @@
           <a:p>
             <a:fld id="{0C5720C1-DBBE-464B-BDF3-8863F8043B23}" type="slidenum">
               <a:rPr lang="en-US" smtClean="0"/>
-              <a:t>‹#›</a:t>
+              <a:t>‹n°›</a:t>
             </a:fld>
             <a:endParaRPr lang="en-US" dirty="0"/>
           </a:p>
@@ -6279,7 +6364,7 @@
           <a:p>
             <a:fld id="{0C5720C1-DBBE-464B-BDF3-8863F8043B23}" type="slidenum">
               <a:rPr lang="en-US" smtClean="0"/>
-              <a:t>‹#›</a:t>
+              <a:t>‹n°›</a:t>
             </a:fld>
             <a:endParaRPr lang="en-US" dirty="0"/>
           </a:p>
@@ -6500,7 +6585,7 @@
           <a:p>
             <a:fld id="{0C5720C1-DBBE-464B-BDF3-8863F8043B23}" type="slidenum">
               <a:rPr lang="en-US" smtClean="0"/>
-              <a:t>‹#›</a:t>
+              <a:t>‹n°›</a:t>
             </a:fld>
             <a:endParaRPr lang="en-US" dirty="0"/>
           </a:p>
@@ -6731,7 +6816,7 @@
           <a:p>
             <a:fld id="{0C5720C1-DBBE-464B-BDF3-8863F8043B23}" type="slidenum">
               <a:rPr lang="en-US" smtClean="0"/>
-              <a:t>‹#›</a:t>
+              <a:t>‹n°›</a:t>
             </a:fld>
             <a:endParaRPr lang="en-US" dirty="0"/>
           </a:p>
@@ -6952,7 +7037,7 @@
           <a:p>
             <a:fld id="{0C5720C1-DBBE-464B-BDF3-8863F8043B23}" type="slidenum">
               <a:rPr lang="en-US" smtClean="0"/>
-              <a:t>‹#›</a:t>
+              <a:t>‹n°›</a:t>
             </a:fld>
             <a:endParaRPr lang="en-US" dirty="0"/>
           </a:p>
@@ -7112,7 +7197,7 @@
           <a:p>
             <a:fld id="{0C5720C1-DBBE-464B-BDF3-8863F8043B23}" type="slidenum">
               <a:rPr lang="en-US" smtClean="0"/>
-              <a:t>‹#›</a:t>
+              <a:t>‹n°›</a:t>
             </a:fld>
             <a:endParaRPr lang="en-US" dirty="0"/>
           </a:p>
@@ -7686,7 +7771,7 @@
           <a:p>
             <a:fld id="{0C5720C1-DBBE-464B-BDF3-8863F8043B23}" type="slidenum">
               <a:rPr lang="en-US" smtClean="0"/>
-              <a:t>‹#›</a:t>
+              <a:t>‹n°›</a:t>
             </a:fld>
             <a:endParaRPr lang="en-US" dirty="0"/>
           </a:p>
@@ -8121,7 +8206,7 @@
           <a:p>
             <a:fld id="{0C5720C1-DBBE-464B-BDF3-8863F8043B23}" type="slidenum">
               <a:rPr lang="en-US" smtClean="0"/>
-              <a:t>‹#›</a:t>
+              <a:t>‹n°›</a:t>
             </a:fld>
             <a:endParaRPr lang="en-US" dirty="0"/>
           </a:p>
@@ -8285,7 +8370,7 @@
           <a:p>
             <a:fld id="{0C5720C1-DBBE-464B-BDF3-8863F8043B23}" type="slidenum">
               <a:rPr lang="en-US" smtClean="0"/>
-              <a:t>‹#›</a:t>
+              <a:t>‹n°›</a:t>
             </a:fld>
             <a:endParaRPr lang="en-US" dirty="0"/>
           </a:p>
@@ -8421,7 +8506,7 @@
           <a:p>
             <a:fld id="{0C5720C1-DBBE-464B-BDF3-8863F8043B23}" type="slidenum">
               <a:rPr lang="en-US" smtClean="0"/>
-              <a:t>‹#›</a:t>
+              <a:t>‹n°›</a:t>
             </a:fld>
             <a:endParaRPr lang="en-US" dirty="0"/>
           </a:p>
@@ -9644,7 +9729,7 @@
           <a:p>
             <a:fld id="{0C5720C1-DBBE-464B-BDF3-8863F8043B23}" type="slidenum">
               <a:rPr lang="en-US" smtClean="0"/>
-              <a:t>‹#›</a:t>
+              <a:t>‹n°›</a:t>
             </a:fld>
             <a:endParaRPr lang="en-US" dirty="0"/>
           </a:p>
@@ -10044,7 +10129,7 @@
         </p:nvSpPr>
         <p:spPr>
           <a:xfrm>
-            <a:off x="0" y="-50336"/>
+            <a:off x="0" y="-37464"/>
             <a:ext cx="27432000" cy="3032892"/>
           </a:xfrm>
           <a:prstGeom prst="rect">
@@ -10288,7 +10373,7 @@
                 <a:latin typeface="Palatino Linotype" panose="02040502050505030304" pitchFamily="18" charset="0"/>
                 <a:cs typeface="NVIDIA Sans Medium" panose="020B0503020203020204" pitchFamily="34" charset="0"/>
               </a:rPr>
-              <a:t>Super cool title that concisely describes the work</a:t>
+              <a:t>PID-CBF Framework for the Safe Landing of Delivery Drones</a:t>
             </a:r>
           </a:p>
         </p:txBody>
@@ -10494,7 +10579,21 @@
                 <a:latin typeface="Palatino Linotype" panose="02040502050505030304" pitchFamily="18" charset="0"/>
                 <a:cs typeface="NVIDIA Sans" panose="020B0503020203020204" pitchFamily="34" charset="0"/>
               </a:rPr>
-              <a:t>First Last, Department of XXXX</a:t>
+              <a:t>Jasper </a:t>
+            </a:r>
+            <a:r>
+              <a:rPr lang="en-US" sz="3001" dirty="0" err="1">
+                <a:latin typeface="Palatino Linotype" panose="02040502050505030304" pitchFamily="18" charset="0"/>
+                <a:cs typeface="NVIDIA Sans" panose="020B0503020203020204" pitchFamily="34" charset="0"/>
+              </a:rPr>
+              <a:t>Matthé</a:t>
+            </a:r>
+            <a:r>
+              <a:rPr lang="en-US" sz="3001" dirty="0">
+                <a:latin typeface="Palatino Linotype" panose="02040502050505030304" pitchFamily="18" charset="0"/>
+                <a:cs typeface="NVIDIA Sans" panose="020B0503020203020204" pitchFamily="34" charset="0"/>
+              </a:rPr>
+              <a:t>, Department of Aeronautics and Astronautics</a:t>
             </a:r>
           </a:p>
         </p:txBody>
@@ -11029,50 +11128,8 @@
                   <a:latin typeface="Palatino Linotype" panose="02040502050505030304" pitchFamily="18" charset="0"/>
                   <a:cs typeface="NVIDIA Sans" panose="020B0503020203020204" pitchFamily="34" charset="0"/>
                 </a:rPr>
-                <a:t>Introduce and motivate the work</a:t>
+                <a:t>Food home deliveries are slow, unreliable, and food arrives cold. Companies like Zipline are slowly reducing last mile delivery times. However, the problem of trust is still an issue. How can one be certain that a robot remains safe and is able to complete its mission under the worst possible disturbances? This project aims to implement a safety robust CBF controller to guarantee the safe landing of a 2nd stage Zipline drone, a droid that is lowered from the mothership drone via a tether to customer's backyards. </a:t>
               </a:r>
-            </a:p>
-            <a:p>
-              <a:pPr marL="0" indent="0" fontAlgn="auto">
-                <a:spcAft>
-                  <a:spcPts val="0"/>
-                </a:spcAft>
-                <a:buNone/>
-              </a:pPr>
-              <a:r>
-                <a:rPr lang="en-US" sz="3200" dirty="0">
-                  <a:latin typeface="Palatino Linotype" panose="02040502050505030304" pitchFamily="18" charset="0"/>
-                  <a:cs typeface="NVIDIA Sans" panose="020B0503020203020204" pitchFamily="34" charset="0"/>
-                </a:rPr>
-                <a:t>What are the key questions you seek to answer?</a:t>
-              </a:r>
-            </a:p>
-            <a:p>
-              <a:pPr marL="0" indent="0" fontAlgn="auto">
-                <a:spcAft>
-                  <a:spcPts val="0"/>
-                </a:spcAft>
-                <a:buNone/>
-              </a:pPr>
-              <a:r>
-                <a:rPr lang="en-US" sz="3200" dirty="0">
-                  <a:latin typeface="Palatino Linotype" panose="02040502050505030304" pitchFamily="18" charset="0"/>
-                  <a:cs typeface="NVIDIA Sans" panose="020B0503020203020204" pitchFamily="34" charset="0"/>
-                </a:rPr>
-                <a:t>What challenges are you addressing?</a:t>
-              </a:r>
-              <a:endParaRPr lang="en-US" sz="2400" dirty="0">
-                <a:latin typeface="Palatino Linotype" panose="02040502050505030304" pitchFamily="18" charset="0"/>
-                <a:cs typeface="NVIDIA Sans" panose="020B0503020203020204" pitchFamily="34" charset="0"/>
-              </a:endParaRPr>
-            </a:p>
-            <a:p>
-              <a:pPr marL="0" indent="0" fontAlgn="auto">
-                <a:spcAft>
-                  <a:spcPts val="0"/>
-                </a:spcAft>
-                <a:buNone/>
-              </a:pPr>
               <a:endParaRPr lang="en-US" sz="2400" dirty="0">
                 <a:latin typeface="Palatino Linotype" panose="02040502050505030304" pitchFamily="18" charset="0"/>
                 <a:cs typeface="NVIDIA Sans" panose="020B0503020203020204" pitchFamily="34" charset="0"/>
@@ -11490,580 +11547,6 @@
       </p:sp>
       <p:grpSp>
         <p:nvGrpSpPr>
-          <p:cNvPr id="5" name="Group 4">
-            <a:extLst>
-              <a:ext uri="{FF2B5EF4-FFF2-40B4-BE49-F238E27FC236}">
-                <a16:creationId xmlns:a16="http://schemas.microsoft.com/office/drawing/2014/main" id="{C4989B81-0C73-793D-4512-618777010A33}"/>
-              </a:ext>
-            </a:extLst>
-          </p:cNvPr>
-          <p:cNvGrpSpPr/>
-          <p:nvPr/>
-        </p:nvGrpSpPr>
-        <p:grpSpPr>
-          <a:xfrm>
-            <a:off x="9556953" y="3582596"/>
-            <a:ext cx="8289737" cy="5884134"/>
-            <a:chOff x="710253" y="3580243"/>
-            <a:chExt cx="8312499" cy="5884134"/>
-          </a:xfrm>
-        </p:grpSpPr>
-        <p:sp>
-          <p:nvSpPr>
-            <p:cNvPr id="6" name="Rectangle 5">
-              <a:extLst>
-                <a:ext uri="{FF2B5EF4-FFF2-40B4-BE49-F238E27FC236}">
-                  <a16:creationId xmlns:a16="http://schemas.microsoft.com/office/drawing/2014/main" id="{CA01D2DE-05DB-32FE-ADAB-62E5F0BD8964}"/>
-                </a:ext>
-              </a:extLst>
-            </p:cNvPr>
-            <p:cNvSpPr/>
-            <p:nvPr/>
-          </p:nvSpPr>
-          <p:spPr>
-            <a:xfrm>
-              <a:off x="710253" y="3580243"/>
-              <a:ext cx="8295578" cy="1029242"/>
-            </a:xfrm>
-            <a:prstGeom prst="rect">
-              <a:avLst/>
-            </a:prstGeom>
-            <a:solidFill>
-              <a:schemeClr val="tx2">
-                <a:alpha val="20000"/>
-              </a:schemeClr>
-            </a:solidFill>
-            <a:ln>
-              <a:noFill/>
-            </a:ln>
-          </p:spPr>
-          <p:style>
-            <a:lnRef idx="2">
-              <a:schemeClr val="accent1">
-                <a:shade val="50000"/>
-              </a:schemeClr>
-            </a:lnRef>
-            <a:fillRef idx="1">
-              <a:schemeClr val="accent1"/>
-            </a:fillRef>
-            <a:effectRef idx="0">
-              <a:schemeClr val="accent1"/>
-            </a:effectRef>
-            <a:fontRef idx="minor">
-              <a:schemeClr val="lt1"/>
-            </a:fontRef>
-          </p:style>
-          <p:txBody>
-            <a:bodyPr rtlCol="0" anchor="ctr"/>
-            <a:lstStyle/>
-            <a:p>
-              <a:pPr algn="ctr"/>
-              <a:endParaRPr lang="en-US">
-                <a:latin typeface="Palatino Linotype" panose="02040502050505030304" pitchFamily="18" charset="0"/>
-              </a:endParaRPr>
-            </a:p>
-          </p:txBody>
-        </p:sp>
-        <p:sp>
-          <p:nvSpPr>
-            <p:cNvPr id="7" name="Text Placeholder 28">
-              <a:extLst>
-                <a:ext uri="{FF2B5EF4-FFF2-40B4-BE49-F238E27FC236}">
-                  <a16:creationId xmlns:a16="http://schemas.microsoft.com/office/drawing/2014/main" id="{97464154-CBE7-9043-EE45-B5A8837CB2C5}"/>
-                </a:ext>
-              </a:extLst>
-            </p:cNvPr>
-            <p:cNvSpPr txBox="1">
-              <a:spLocks/>
-            </p:cNvSpPr>
-            <p:nvPr/>
-          </p:nvSpPr>
-          <p:spPr>
-            <a:xfrm>
-              <a:off x="840960" y="3716436"/>
-              <a:ext cx="8070575" cy="892969"/>
-            </a:xfrm>
-            <a:prstGeom prst="rect">
-              <a:avLst/>
-            </a:prstGeom>
-          </p:spPr>
-          <p:txBody>
-            <a:bodyPr/>
-            <a:lstStyle>
-              <a:lvl1pPr marL="685800" indent="-685800" algn="l" defTabSz="2743200" rtl="0" eaLnBrk="1" latinLnBrk="0" hangingPunct="1">
-                <a:lnSpc>
-                  <a:spcPct val="90000"/>
-                </a:lnSpc>
-                <a:spcBef>
-                  <a:spcPts val="3000"/>
-                </a:spcBef>
-                <a:buFont typeface="Arial" panose="020B0604020202020204" pitchFamily="34" charset="0"/>
-                <a:buChar char="•"/>
-                <a:defRPr sz="8400" kern="1200">
-                  <a:solidFill>
-                    <a:schemeClr val="tx1"/>
-                  </a:solidFill>
-                  <a:latin typeface="+mn-lt"/>
-                  <a:ea typeface="+mn-ea"/>
-                  <a:cs typeface="+mn-cs"/>
-                </a:defRPr>
-              </a:lvl1pPr>
-              <a:lvl2pPr marL="2057400" indent="-685800" algn="l" defTabSz="2743200" rtl="0" eaLnBrk="1" latinLnBrk="0" hangingPunct="1">
-                <a:lnSpc>
-                  <a:spcPct val="90000"/>
-                </a:lnSpc>
-                <a:spcBef>
-                  <a:spcPts val="1500"/>
-                </a:spcBef>
-                <a:buFont typeface="Arial" panose="020B0604020202020204" pitchFamily="34" charset="0"/>
-                <a:buChar char="•"/>
-                <a:defRPr sz="7200" kern="1200">
-                  <a:solidFill>
-                    <a:schemeClr val="tx1"/>
-                  </a:solidFill>
-                  <a:latin typeface="+mn-lt"/>
-                  <a:ea typeface="+mn-ea"/>
-                  <a:cs typeface="+mn-cs"/>
-                </a:defRPr>
-              </a:lvl2pPr>
-              <a:lvl3pPr marL="3429000" indent="-685800" algn="l" defTabSz="2743200" rtl="0" eaLnBrk="1" latinLnBrk="0" hangingPunct="1">
-                <a:lnSpc>
-                  <a:spcPct val="90000"/>
-                </a:lnSpc>
-                <a:spcBef>
-                  <a:spcPts val="1500"/>
-                </a:spcBef>
-                <a:buFont typeface="Arial" panose="020B0604020202020204" pitchFamily="34" charset="0"/>
-                <a:buChar char="•"/>
-                <a:defRPr sz="6000" kern="1200">
-                  <a:solidFill>
-                    <a:schemeClr val="tx1"/>
-                  </a:solidFill>
-                  <a:latin typeface="+mn-lt"/>
-                  <a:ea typeface="+mn-ea"/>
-                  <a:cs typeface="+mn-cs"/>
-                </a:defRPr>
-              </a:lvl3pPr>
-              <a:lvl4pPr marL="4800600" indent="-685800" algn="l" defTabSz="2743200" rtl="0" eaLnBrk="1" latinLnBrk="0" hangingPunct="1">
-                <a:lnSpc>
-                  <a:spcPct val="90000"/>
-                </a:lnSpc>
-                <a:spcBef>
-                  <a:spcPts val="1500"/>
-                </a:spcBef>
-                <a:buFont typeface="Arial" panose="020B0604020202020204" pitchFamily="34" charset="0"/>
-                <a:buChar char="•"/>
-                <a:defRPr sz="5400" kern="1200">
-                  <a:solidFill>
-                    <a:schemeClr val="tx1"/>
-                  </a:solidFill>
-                  <a:latin typeface="+mn-lt"/>
-                  <a:ea typeface="+mn-ea"/>
-                  <a:cs typeface="+mn-cs"/>
-                </a:defRPr>
-              </a:lvl4pPr>
-              <a:lvl5pPr marL="6172200" indent="-685800" algn="l" defTabSz="2743200" rtl="0" eaLnBrk="1" latinLnBrk="0" hangingPunct="1">
-                <a:lnSpc>
-                  <a:spcPct val="90000"/>
-                </a:lnSpc>
-                <a:spcBef>
-                  <a:spcPts val="1500"/>
-                </a:spcBef>
-                <a:buFont typeface="Arial" panose="020B0604020202020204" pitchFamily="34" charset="0"/>
-                <a:buChar char="•"/>
-                <a:defRPr sz="5400" kern="1200">
-                  <a:solidFill>
-                    <a:schemeClr val="tx1"/>
-                  </a:solidFill>
-                  <a:latin typeface="+mn-lt"/>
-                  <a:ea typeface="+mn-ea"/>
-                  <a:cs typeface="+mn-cs"/>
-                </a:defRPr>
-              </a:lvl5pPr>
-              <a:lvl6pPr marL="7543800" indent="-685800" algn="l" defTabSz="2743200" rtl="0" eaLnBrk="1" latinLnBrk="0" hangingPunct="1">
-                <a:lnSpc>
-                  <a:spcPct val="90000"/>
-                </a:lnSpc>
-                <a:spcBef>
-                  <a:spcPts val="1500"/>
-                </a:spcBef>
-                <a:buFont typeface="Arial" panose="020B0604020202020204" pitchFamily="34" charset="0"/>
-                <a:buChar char="•"/>
-                <a:defRPr sz="5400" kern="1200">
-                  <a:solidFill>
-                    <a:schemeClr val="tx1"/>
-                  </a:solidFill>
-                  <a:latin typeface="+mn-lt"/>
-                  <a:ea typeface="+mn-ea"/>
-                  <a:cs typeface="+mn-cs"/>
-                </a:defRPr>
-              </a:lvl6pPr>
-              <a:lvl7pPr marL="8915400" indent="-685800" algn="l" defTabSz="2743200" rtl="0" eaLnBrk="1" latinLnBrk="0" hangingPunct="1">
-                <a:lnSpc>
-                  <a:spcPct val="90000"/>
-                </a:lnSpc>
-                <a:spcBef>
-                  <a:spcPts val="1500"/>
-                </a:spcBef>
-                <a:buFont typeface="Arial" panose="020B0604020202020204" pitchFamily="34" charset="0"/>
-                <a:buChar char="•"/>
-                <a:defRPr sz="5400" kern="1200">
-                  <a:solidFill>
-                    <a:schemeClr val="tx1"/>
-                  </a:solidFill>
-                  <a:latin typeface="+mn-lt"/>
-                  <a:ea typeface="+mn-ea"/>
-                  <a:cs typeface="+mn-cs"/>
-                </a:defRPr>
-              </a:lvl7pPr>
-              <a:lvl8pPr marL="10287000" indent="-685800" algn="l" defTabSz="2743200" rtl="0" eaLnBrk="1" latinLnBrk="0" hangingPunct="1">
-                <a:lnSpc>
-                  <a:spcPct val="90000"/>
-                </a:lnSpc>
-                <a:spcBef>
-                  <a:spcPts val="1500"/>
-                </a:spcBef>
-                <a:buFont typeface="Arial" panose="020B0604020202020204" pitchFamily="34" charset="0"/>
-                <a:buChar char="•"/>
-                <a:defRPr sz="5400" kern="1200">
-                  <a:solidFill>
-                    <a:schemeClr val="tx1"/>
-                  </a:solidFill>
-                  <a:latin typeface="+mn-lt"/>
-                  <a:ea typeface="+mn-ea"/>
-                  <a:cs typeface="+mn-cs"/>
-                </a:defRPr>
-              </a:lvl8pPr>
-              <a:lvl9pPr marL="11658600" indent="-685800" algn="l" defTabSz="2743200" rtl="0" eaLnBrk="1" latinLnBrk="0" hangingPunct="1">
-                <a:lnSpc>
-                  <a:spcPct val="90000"/>
-                </a:lnSpc>
-                <a:spcBef>
-                  <a:spcPts val="1500"/>
-                </a:spcBef>
-                <a:buFont typeface="Arial" panose="020B0604020202020204" pitchFamily="34" charset="0"/>
-                <a:buChar char="•"/>
-                <a:defRPr sz="5400" kern="1200">
-                  <a:solidFill>
-                    <a:schemeClr val="tx1"/>
-                  </a:solidFill>
-                  <a:latin typeface="+mn-lt"/>
-                  <a:ea typeface="+mn-ea"/>
-                  <a:cs typeface="+mn-cs"/>
-                </a:defRPr>
-              </a:lvl9pPr>
-            </a:lstStyle>
-            <a:p>
-              <a:pPr marL="0" indent="0" fontAlgn="auto">
-                <a:spcAft>
-                  <a:spcPts val="0"/>
-                </a:spcAft>
-                <a:buNone/>
-              </a:pPr>
-              <a:r>
-                <a:rPr lang="en-US" sz="5400" b="1" dirty="0">
-                  <a:latin typeface="Palatino Linotype" panose="02040502050505030304" pitchFamily="18" charset="0"/>
-                  <a:cs typeface="NVIDIA Sans" panose="020B0503020203020204" pitchFamily="34" charset="0"/>
-                </a:rPr>
-                <a:t>Background </a:t>
-              </a:r>
-            </a:p>
-          </p:txBody>
-        </p:sp>
-        <p:sp>
-          <p:nvSpPr>
-            <p:cNvPr id="8" name="Text Placeholder 35">
-              <a:extLst>
-                <a:ext uri="{FF2B5EF4-FFF2-40B4-BE49-F238E27FC236}">
-                  <a16:creationId xmlns:a16="http://schemas.microsoft.com/office/drawing/2014/main" id="{D509B252-E78C-BDF4-3597-4CEB6AEC4374}"/>
-                </a:ext>
-              </a:extLst>
-            </p:cNvPr>
-            <p:cNvSpPr txBox="1">
-              <a:spLocks/>
-            </p:cNvSpPr>
-            <p:nvPr/>
-          </p:nvSpPr>
-          <p:spPr>
-            <a:xfrm>
-              <a:off x="844956" y="4737805"/>
-              <a:ext cx="8086567" cy="4417177"/>
-            </a:xfrm>
-            <a:prstGeom prst="rect">
-              <a:avLst/>
-            </a:prstGeom>
-          </p:spPr>
-          <p:txBody>
-            <a:bodyPr/>
-            <a:lstStyle>
-              <a:lvl1pPr marL="685800" indent="-685800" algn="l" defTabSz="2743200" rtl="0" eaLnBrk="1" latinLnBrk="0" hangingPunct="1">
-                <a:lnSpc>
-                  <a:spcPct val="90000"/>
-                </a:lnSpc>
-                <a:spcBef>
-                  <a:spcPts val="3000"/>
-                </a:spcBef>
-                <a:buFont typeface="Arial" panose="020B0604020202020204" pitchFamily="34" charset="0"/>
-                <a:buChar char="•"/>
-                <a:defRPr sz="8400" kern="1200">
-                  <a:solidFill>
-                    <a:schemeClr val="tx1"/>
-                  </a:solidFill>
-                  <a:latin typeface="+mn-lt"/>
-                  <a:ea typeface="+mn-ea"/>
-                  <a:cs typeface="+mn-cs"/>
-                </a:defRPr>
-              </a:lvl1pPr>
-              <a:lvl2pPr marL="2057400" indent="-685800" algn="l" defTabSz="2743200" rtl="0" eaLnBrk="1" latinLnBrk="0" hangingPunct="1">
-                <a:lnSpc>
-                  <a:spcPct val="90000"/>
-                </a:lnSpc>
-                <a:spcBef>
-                  <a:spcPts val="1500"/>
-                </a:spcBef>
-                <a:buFont typeface="Arial" panose="020B0604020202020204" pitchFamily="34" charset="0"/>
-                <a:buChar char="•"/>
-                <a:defRPr sz="7200" kern="1200">
-                  <a:solidFill>
-                    <a:schemeClr val="tx1"/>
-                  </a:solidFill>
-                  <a:latin typeface="+mn-lt"/>
-                  <a:ea typeface="+mn-ea"/>
-                  <a:cs typeface="+mn-cs"/>
-                </a:defRPr>
-              </a:lvl2pPr>
-              <a:lvl3pPr marL="3429000" indent="-685800" algn="l" defTabSz="2743200" rtl="0" eaLnBrk="1" latinLnBrk="0" hangingPunct="1">
-                <a:lnSpc>
-                  <a:spcPct val="90000"/>
-                </a:lnSpc>
-                <a:spcBef>
-                  <a:spcPts val="1500"/>
-                </a:spcBef>
-                <a:buFont typeface="Arial" panose="020B0604020202020204" pitchFamily="34" charset="0"/>
-                <a:buChar char="•"/>
-                <a:defRPr sz="6000" kern="1200">
-                  <a:solidFill>
-                    <a:schemeClr val="tx1"/>
-                  </a:solidFill>
-                  <a:latin typeface="+mn-lt"/>
-                  <a:ea typeface="+mn-ea"/>
-                  <a:cs typeface="+mn-cs"/>
-                </a:defRPr>
-              </a:lvl3pPr>
-              <a:lvl4pPr marL="4800600" indent="-685800" algn="l" defTabSz="2743200" rtl="0" eaLnBrk="1" latinLnBrk="0" hangingPunct="1">
-                <a:lnSpc>
-                  <a:spcPct val="90000"/>
-                </a:lnSpc>
-                <a:spcBef>
-                  <a:spcPts val="1500"/>
-                </a:spcBef>
-                <a:buFont typeface="Arial" panose="020B0604020202020204" pitchFamily="34" charset="0"/>
-                <a:buChar char="•"/>
-                <a:defRPr sz="5400" kern="1200">
-                  <a:solidFill>
-                    <a:schemeClr val="tx1"/>
-                  </a:solidFill>
-                  <a:latin typeface="+mn-lt"/>
-                  <a:ea typeface="+mn-ea"/>
-                  <a:cs typeface="+mn-cs"/>
-                </a:defRPr>
-              </a:lvl4pPr>
-              <a:lvl5pPr marL="6172200" indent="-685800" algn="l" defTabSz="2743200" rtl="0" eaLnBrk="1" latinLnBrk="0" hangingPunct="1">
-                <a:lnSpc>
-                  <a:spcPct val="90000"/>
-                </a:lnSpc>
-                <a:spcBef>
-                  <a:spcPts val="1500"/>
-                </a:spcBef>
-                <a:buFont typeface="Arial" panose="020B0604020202020204" pitchFamily="34" charset="0"/>
-                <a:buChar char="•"/>
-                <a:defRPr sz="5400" kern="1200">
-                  <a:solidFill>
-                    <a:schemeClr val="tx1"/>
-                  </a:solidFill>
-                  <a:latin typeface="+mn-lt"/>
-                  <a:ea typeface="+mn-ea"/>
-                  <a:cs typeface="+mn-cs"/>
-                </a:defRPr>
-              </a:lvl5pPr>
-              <a:lvl6pPr marL="7543800" indent="-685800" algn="l" defTabSz="2743200" rtl="0" eaLnBrk="1" latinLnBrk="0" hangingPunct="1">
-                <a:lnSpc>
-                  <a:spcPct val="90000"/>
-                </a:lnSpc>
-                <a:spcBef>
-                  <a:spcPts val="1500"/>
-                </a:spcBef>
-                <a:buFont typeface="Arial" panose="020B0604020202020204" pitchFamily="34" charset="0"/>
-                <a:buChar char="•"/>
-                <a:defRPr sz="5400" kern="1200">
-                  <a:solidFill>
-                    <a:schemeClr val="tx1"/>
-                  </a:solidFill>
-                  <a:latin typeface="+mn-lt"/>
-                  <a:ea typeface="+mn-ea"/>
-                  <a:cs typeface="+mn-cs"/>
-                </a:defRPr>
-              </a:lvl6pPr>
-              <a:lvl7pPr marL="8915400" indent="-685800" algn="l" defTabSz="2743200" rtl="0" eaLnBrk="1" latinLnBrk="0" hangingPunct="1">
-                <a:lnSpc>
-                  <a:spcPct val="90000"/>
-                </a:lnSpc>
-                <a:spcBef>
-                  <a:spcPts val="1500"/>
-                </a:spcBef>
-                <a:buFont typeface="Arial" panose="020B0604020202020204" pitchFamily="34" charset="0"/>
-                <a:buChar char="•"/>
-                <a:defRPr sz="5400" kern="1200">
-                  <a:solidFill>
-                    <a:schemeClr val="tx1"/>
-                  </a:solidFill>
-                  <a:latin typeface="+mn-lt"/>
-                  <a:ea typeface="+mn-ea"/>
-                  <a:cs typeface="+mn-cs"/>
-                </a:defRPr>
-              </a:lvl7pPr>
-              <a:lvl8pPr marL="10287000" indent="-685800" algn="l" defTabSz="2743200" rtl="0" eaLnBrk="1" latinLnBrk="0" hangingPunct="1">
-                <a:lnSpc>
-                  <a:spcPct val="90000"/>
-                </a:lnSpc>
-                <a:spcBef>
-                  <a:spcPts val="1500"/>
-                </a:spcBef>
-                <a:buFont typeface="Arial" panose="020B0604020202020204" pitchFamily="34" charset="0"/>
-                <a:buChar char="•"/>
-                <a:defRPr sz="5400" kern="1200">
-                  <a:solidFill>
-                    <a:schemeClr val="tx1"/>
-                  </a:solidFill>
-                  <a:latin typeface="+mn-lt"/>
-                  <a:ea typeface="+mn-ea"/>
-                  <a:cs typeface="+mn-cs"/>
-                </a:defRPr>
-              </a:lvl8pPr>
-              <a:lvl9pPr marL="11658600" indent="-685800" algn="l" defTabSz="2743200" rtl="0" eaLnBrk="1" latinLnBrk="0" hangingPunct="1">
-                <a:lnSpc>
-                  <a:spcPct val="90000"/>
-                </a:lnSpc>
-                <a:spcBef>
-                  <a:spcPts val="1500"/>
-                </a:spcBef>
-                <a:buFont typeface="Arial" panose="020B0604020202020204" pitchFamily="34" charset="0"/>
-                <a:buChar char="•"/>
-                <a:defRPr sz="5400" kern="1200">
-                  <a:solidFill>
-                    <a:schemeClr val="tx1"/>
-                  </a:solidFill>
-                  <a:latin typeface="+mn-lt"/>
-                  <a:ea typeface="+mn-ea"/>
-                  <a:cs typeface="+mn-cs"/>
-                </a:defRPr>
-              </a:lvl9pPr>
-            </a:lstStyle>
-            <a:p>
-              <a:pPr marL="0" indent="0" fontAlgn="auto">
-                <a:spcAft>
-                  <a:spcPts val="0"/>
-                </a:spcAft>
-                <a:buNone/>
-              </a:pPr>
-              <a:r>
-                <a:rPr lang="en-US" sz="3200" dirty="0">
-                  <a:latin typeface="Palatino Linotype" panose="02040502050505030304" pitchFamily="18" charset="0"/>
-                  <a:cs typeface="NVIDIA Sans" panose="020B0503020203020204" pitchFamily="34" charset="0"/>
-                </a:rPr>
-                <a:t>Some background material about the technical approach</a:t>
-              </a:r>
-            </a:p>
-            <a:p>
-              <a:pPr marL="0" indent="0" fontAlgn="auto">
-                <a:spcAft>
-                  <a:spcPts val="0"/>
-                </a:spcAft>
-                <a:buNone/>
-              </a:pPr>
-              <a:r>
-                <a:rPr lang="en-US" sz="3200" dirty="0">
-                  <a:latin typeface="Palatino Linotype" panose="02040502050505030304" pitchFamily="18" charset="0"/>
-                  <a:cs typeface="NVIDIA Sans" panose="020B0503020203020204" pitchFamily="34" charset="0"/>
-                </a:rPr>
-                <a:t>Figures!</a:t>
-              </a:r>
-              <a:endParaRPr lang="en-US" sz="2400" dirty="0">
-                <a:latin typeface="Palatino Linotype" panose="02040502050505030304" pitchFamily="18" charset="0"/>
-                <a:cs typeface="NVIDIA Sans" panose="020B0503020203020204" pitchFamily="34" charset="0"/>
-              </a:endParaRPr>
-            </a:p>
-            <a:p>
-              <a:pPr marL="0" indent="0" fontAlgn="auto">
-                <a:spcAft>
-                  <a:spcPts val="0"/>
-                </a:spcAft>
-                <a:buNone/>
-              </a:pPr>
-              <a:endParaRPr lang="en-US" sz="2400" dirty="0">
-                <a:latin typeface="Palatino Linotype" panose="02040502050505030304" pitchFamily="18" charset="0"/>
-                <a:cs typeface="NVIDIA Sans" panose="020B0503020203020204" pitchFamily="34" charset="0"/>
-              </a:endParaRPr>
-            </a:p>
-          </p:txBody>
-        </p:sp>
-        <p:sp>
-          <p:nvSpPr>
-            <p:cNvPr id="9" name="Rectangle 8">
-              <a:extLst>
-                <a:ext uri="{FF2B5EF4-FFF2-40B4-BE49-F238E27FC236}">
-                  <a16:creationId xmlns:a16="http://schemas.microsoft.com/office/drawing/2014/main" id="{57882241-EE81-E49D-1B0D-8893926522BD}"/>
-                </a:ext>
-              </a:extLst>
-            </p:cNvPr>
-            <p:cNvSpPr/>
-            <p:nvPr/>
-          </p:nvSpPr>
-          <p:spPr>
-            <a:xfrm>
-              <a:off x="731056" y="3588037"/>
-              <a:ext cx="8291696" cy="5876340"/>
-            </a:xfrm>
-            <a:prstGeom prst="rect">
-              <a:avLst/>
-            </a:prstGeom>
-            <a:noFill/>
-            <a:ln>
-              <a:solidFill>
-                <a:schemeClr val="tx1"/>
-              </a:solidFill>
-            </a:ln>
-          </p:spPr>
-          <p:style>
-            <a:lnRef idx="2">
-              <a:schemeClr val="accent1">
-                <a:shade val="50000"/>
-              </a:schemeClr>
-            </a:lnRef>
-            <a:fillRef idx="1">
-              <a:schemeClr val="accent1"/>
-            </a:fillRef>
-            <a:effectRef idx="0">
-              <a:schemeClr val="accent1"/>
-            </a:effectRef>
-            <a:fontRef idx="minor">
-              <a:schemeClr val="lt1"/>
-            </a:fontRef>
-          </p:style>
-          <p:txBody>
-            <a:bodyPr rtlCol="0" anchor="ctr"/>
-            <a:lstStyle/>
-            <a:p>
-              <a:pPr algn="ctr"/>
-              <a:endParaRPr lang="en-US">
-                <a:latin typeface="Palatino Linotype" panose="02040502050505030304" pitchFamily="18" charset="0"/>
-              </a:endParaRPr>
-            </a:p>
-          </p:txBody>
-        </p:sp>
-      </p:grpSp>
-      <p:grpSp>
-        <p:nvGrpSpPr>
           <p:cNvPr id="10" name="Group 9">
             <a:extLst>
               <a:ext uri="{FF2B5EF4-FFF2-40B4-BE49-F238E27FC236}">
@@ -12077,9 +11560,9 @@
         <p:grpSpPr>
           <a:xfrm>
             <a:off x="18464386" y="3582596"/>
-            <a:ext cx="8289737" cy="11254776"/>
+            <a:ext cx="8289737" cy="11938538"/>
             <a:chOff x="710253" y="3580243"/>
-            <a:chExt cx="8312499" cy="11254776"/>
+            <a:chExt cx="8312499" cy="11938538"/>
           </a:xfrm>
         </p:grpSpPr>
         <p:sp>
@@ -12361,7 +11844,7 @@
           <p:spPr>
             <a:xfrm>
               <a:off x="844956" y="4737804"/>
-              <a:ext cx="8086567" cy="9975843"/>
+              <a:ext cx="8086567" cy="10301740"/>
             </a:xfrm>
             <a:prstGeom prst="rect">
               <a:avLst/>
@@ -12545,8 +12028,68 @@
                   <a:latin typeface="Palatino Linotype" panose="02040502050505030304" pitchFamily="18" charset="0"/>
                   <a:cs typeface="NVIDIA Sans" panose="020B0503020203020204" pitchFamily="34" charset="0"/>
                 </a:rPr>
-                <a:t>Describe your experimental set up</a:t>
+                <a:t>Using a droid of 4 kg, a drag coefficient of 1 (assuming drone is boxy), maximum wind gusts of up to 40 m/s (90 mph), and a maximum allowable deflection angle of 10 deg. A simulation of the droid’s dynamics produces the following swing angles over time:</a:t>
               </a:r>
+            </a:p>
+            <a:p>
+              <a:pPr marL="0" indent="0" fontAlgn="auto">
+                <a:spcAft>
+                  <a:spcPts val="0"/>
+                </a:spcAft>
+                <a:buNone/>
+              </a:pPr>
+              <a:endParaRPr lang="en-US" sz="3200" dirty="0">
+                <a:latin typeface="Palatino Linotype" panose="02040502050505030304" pitchFamily="18" charset="0"/>
+                <a:cs typeface="NVIDIA Sans" panose="020B0503020203020204" pitchFamily="34" charset="0"/>
+              </a:endParaRPr>
+            </a:p>
+            <a:p>
+              <a:pPr marL="0" indent="0" fontAlgn="auto">
+                <a:spcAft>
+                  <a:spcPts val="0"/>
+                </a:spcAft>
+                <a:buNone/>
+              </a:pPr>
+              <a:endParaRPr lang="en-US" sz="3200" dirty="0">
+                <a:latin typeface="Palatino Linotype" panose="02040502050505030304" pitchFamily="18" charset="0"/>
+                <a:cs typeface="NVIDIA Sans" panose="020B0503020203020204" pitchFamily="34" charset="0"/>
+              </a:endParaRPr>
+            </a:p>
+            <a:p>
+              <a:pPr marL="0" indent="0" fontAlgn="auto">
+                <a:spcAft>
+                  <a:spcPts val="0"/>
+                </a:spcAft>
+                <a:buNone/>
+              </a:pPr>
+              <a:endParaRPr lang="en-US" sz="3200" dirty="0">
+                <a:latin typeface="Palatino Linotype" panose="02040502050505030304" pitchFamily="18" charset="0"/>
+                <a:cs typeface="NVIDIA Sans" panose="020B0503020203020204" pitchFamily="34" charset="0"/>
+              </a:endParaRPr>
+            </a:p>
+            <a:p>
+              <a:pPr marL="0" indent="0" fontAlgn="auto">
+                <a:spcAft>
+                  <a:spcPts val="0"/>
+                </a:spcAft>
+                <a:buNone/>
+              </a:pPr>
+              <a:endParaRPr lang="en-US" sz="3200" dirty="0">
+                <a:latin typeface="Palatino Linotype" panose="02040502050505030304" pitchFamily="18" charset="0"/>
+                <a:cs typeface="NVIDIA Sans" panose="020B0503020203020204" pitchFamily="34" charset="0"/>
+              </a:endParaRPr>
+            </a:p>
+            <a:p>
+              <a:pPr marL="0" indent="0" fontAlgn="auto">
+                <a:spcAft>
+                  <a:spcPts val="0"/>
+                </a:spcAft>
+                <a:buNone/>
+              </a:pPr>
+              <a:endParaRPr lang="en-US" sz="3200" dirty="0">
+                <a:latin typeface="Palatino Linotype" panose="02040502050505030304" pitchFamily="18" charset="0"/>
+                <a:cs typeface="NVIDIA Sans" panose="020B0503020203020204" pitchFamily="34" charset="0"/>
+              </a:endParaRPr>
             </a:p>
             <a:p>
               <a:pPr marL="0" indent="0" fontAlgn="auto">
@@ -12560,21 +12103,7 @@
                   <a:latin typeface="Palatino Linotype" panose="02040502050505030304" pitchFamily="18" charset="0"/>
                   <a:cs typeface="NVIDIA Sans" panose="020B0503020203020204" pitchFamily="34" charset="0"/>
                 </a:rPr>
-                <a:t>Show results (plots, statistics, </a:t>
-              </a:r>
-              <a:r>
-                <a:rPr lang="en-US" sz="3200" dirty="0" err="1">
-                  <a:latin typeface="Palatino Linotype" panose="02040502050505030304" pitchFamily="18" charset="0"/>
-                  <a:cs typeface="NVIDIA Sans" panose="020B0503020203020204" pitchFamily="34" charset="0"/>
-                </a:rPr>
-                <a:t>etc</a:t>
-              </a:r>
-              <a:r>
-                <a:rPr lang="en-US" sz="3200" dirty="0">
-                  <a:latin typeface="Palatino Linotype" panose="02040502050505030304" pitchFamily="18" charset="0"/>
-                  <a:cs typeface="NVIDIA Sans" panose="020B0503020203020204" pitchFamily="34" charset="0"/>
-                </a:rPr>
-                <a:t>)</a:t>
+                <a:t>The PID controller clearly violates safety constraints multiple times. The PID-CBF controller maintains well away from the boundaries. The PID-HJ-CBF controller is not safer than the PID controller, perhaps due to coarse interpolation of gradients from the value function.</a:t>
               </a:r>
             </a:p>
             <a:p>
@@ -12584,14 +12113,7 @@
                 </a:spcAft>
                 <a:buNone/>
               </a:pPr>
-              <a:r>
-                <a:rPr lang="en-US" sz="3200" dirty="0">
-                  <a:latin typeface="Palatino Linotype" panose="02040502050505030304" pitchFamily="18" charset="0"/>
-                  <a:cs typeface="NVIDIA Sans" panose="020B0503020203020204" pitchFamily="34" charset="0"/>
-                </a:rPr>
-                <a:t>Discuss findings</a:t>
-              </a:r>
-              <a:endParaRPr lang="en-US" sz="2400" dirty="0">
+              <a:endParaRPr lang="en-US" sz="3200" dirty="0">
                 <a:latin typeface="Palatino Linotype" panose="02040502050505030304" pitchFamily="18" charset="0"/>
                 <a:cs typeface="NVIDIA Sans" panose="020B0503020203020204" pitchFamily="34" charset="0"/>
               </a:endParaRPr>
@@ -12603,7 +12125,7 @@
                 </a:spcAft>
                 <a:buNone/>
               </a:pPr>
-              <a:endParaRPr lang="en-US" sz="2400" dirty="0">
+              <a:endParaRPr lang="en-US" sz="3200" dirty="0">
                 <a:latin typeface="Palatino Linotype" panose="02040502050505030304" pitchFamily="18" charset="0"/>
                 <a:cs typeface="NVIDIA Sans" panose="020B0503020203020204" pitchFamily="34" charset="0"/>
               </a:endParaRPr>
@@ -12624,8 +12146,8 @@
           </p:nvSpPr>
           <p:spPr>
             <a:xfrm>
-              <a:off x="731056" y="3588037"/>
-              <a:ext cx="8291696" cy="11246982"/>
+              <a:off x="731056" y="3588036"/>
+              <a:ext cx="8291696" cy="11930745"/>
             </a:xfrm>
             <a:prstGeom prst="rect">
               <a:avLst/>
@@ -13148,7 +12670,7 @@
                   <a:latin typeface="Palatino Linotype" panose="02040502050505030304" pitchFamily="18" charset="0"/>
                   <a:cs typeface="NVIDIA Sans" panose="020B0503020203020204" pitchFamily="34" charset="0"/>
                 </a:rPr>
-                <a:t>Describe the problem</a:t>
+                <a:t>The droid is modelled in a 2D plane as a bob attached to the fixed mothership via an inelastic, massless tether The state of the droid is its swing angle, swing rate, and tether length. The inputs to the system are the droid's thrust, which acts perpendicular to the tether, and the commanded reel-out rate of the tether. The disturbance to the system is a stochastic bounded horizontal wind speed.</a:t>
               </a:r>
             </a:p>
             <a:p>
@@ -13158,88 +12680,7 @@
                 </a:spcAft>
                 <a:buNone/>
               </a:pPr>
-              <a:r>
-                <a:rPr lang="en-US" sz="3200" dirty="0">
-                  <a:latin typeface="Palatino Linotype" panose="02040502050505030304" pitchFamily="18" charset="0"/>
-                  <a:cs typeface="NVIDIA Sans" panose="020B0503020203020204" pitchFamily="34" charset="0"/>
-                </a:rPr>
-                <a:t>Describe the main components of the problem</a:t>
-              </a:r>
-            </a:p>
-            <a:p>
-              <a:pPr fontAlgn="auto">
-                <a:spcAft>
-                  <a:spcPts val="0"/>
-                </a:spcAft>
-              </a:pPr>
-              <a:r>
-                <a:rPr lang="en-US" sz="3200" dirty="0">
-                  <a:latin typeface="Palatino Linotype" panose="02040502050505030304" pitchFamily="18" charset="0"/>
-                  <a:cs typeface="NVIDIA Sans" panose="020B0503020203020204" pitchFamily="34" charset="0"/>
-                </a:rPr>
-                <a:t>Dynamics? Non-linear?</a:t>
-              </a:r>
-            </a:p>
-            <a:p>
-              <a:pPr fontAlgn="auto">
-                <a:spcAft>
-                  <a:spcPts val="0"/>
-                </a:spcAft>
-              </a:pPr>
-              <a:r>
-                <a:rPr lang="en-US" sz="3200" dirty="0">
-                  <a:latin typeface="Palatino Linotype" panose="02040502050505030304" pitchFamily="18" charset="0"/>
-                  <a:cs typeface="NVIDIA Sans" panose="020B0503020203020204" pitchFamily="34" charset="0"/>
-                </a:rPr>
-                <a:t>Assumptions?</a:t>
-              </a:r>
-            </a:p>
-            <a:p>
-              <a:pPr fontAlgn="auto">
-                <a:spcAft>
-                  <a:spcPts val="0"/>
-                </a:spcAft>
-              </a:pPr>
-              <a:r>
-                <a:rPr lang="en-US" sz="3200" dirty="0">
-                  <a:latin typeface="Palatino Linotype" panose="02040502050505030304" pitchFamily="18" charset="0"/>
-                  <a:cs typeface="NVIDIA Sans" panose="020B0503020203020204" pitchFamily="34" charset="0"/>
-                </a:rPr>
-                <a:t>Other components?</a:t>
-              </a:r>
-            </a:p>
-            <a:p>
-              <a:pPr fontAlgn="auto">
-                <a:spcAft>
-                  <a:spcPts val="0"/>
-                </a:spcAft>
-              </a:pPr>
-              <a:r>
-                <a:rPr lang="en-US" sz="3200" dirty="0">
-                  <a:latin typeface="Palatino Linotype" panose="02040502050505030304" pitchFamily="18" charset="0"/>
-                  <a:cs typeface="NVIDIA Sans" panose="020B0503020203020204" pitchFamily="34" charset="0"/>
-                </a:rPr>
-                <a:t>Picture of the system?</a:t>
-              </a:r>
-            </a:p>
-            <a:p>
-              <a:pPr fontAlgn="auto">
-                <a:spcAft>
-                  <a:spcPts val="0"/>
-                </a:spcAft>
-              </a:pPr>
               <a:endParaRPr lang="en-US" sz="3200" dirty="0">
-                <a:latin typeface="Palatino Linotype" panose="02040502050505030304" pitchFamily="18" charset="0"/>
-                <a:cs typeface="NVIDIA Sans" panose="020B0503020203020204" pitchFamily="34" charset="0"/>
-              </a:endParaRPr>
-            </a:p>
-            <a:p>
-              <a:pPr fontAlgn="auto">
-                <a:spcAft>
-                  <a:spcPts val="0"/>
-                </a:spcAft>
-              </a:pPr>
-              <a:endParaRPr lang="en-US" sz="2400" dirty="0">
                 <a:latin typeface="Palatino Linotype" panose="02040502050505030304" pitchFamily="18" charset="0"/>
                 <a:cs typeface="NVIDIA Sans" panose="020B0503020203020204" pitchFamily="34" charset="0"/>
               </a:endParaRPr>
@@ -13327,8 +12768,8 @@
         </p:nvGrpSpPr>
         <p:grpSpPr>
           <a:xfrm>
-            <a:off x="9556953" y="9972161"/>
-            <a:ext cx="8289737" cy="11374856"/>
+            <a:off x="9556953" y="3590389"/>
+            <a:ext cx="8289737" cy="17756628"/>
             <a:chOff x="710253" y="3580243"/>
             <a:chExt cx="8312499" cy="11374856"/>
           </a:xfrm>
@@ -13348,7 +12789,7 @@
           <p:spPr>
             <a:xfrm>
               <a:off x="710253" y="3580243"/>
-              <a:ext cx="8295578" cy="1029242"/>
+              <a:ext cx="8295578" cy="654287"/>
             </a:xfrm>
             <a:prstGeom prst="rect">
               <a:avLst/>
@@ -13595,290 +13036,488 @@
             </a:p>
           </p:txBody>
         </p:sp>
-        <p:sp>
-          <p:nvSpPr>
-            <p:cNvPr id="78" name="Text Placeholder 35">
-              <a:extLst>
-                <a:ext uri="{FF2B5EF4-FFF2-40B4-BE49-F238E27FC236}">
-                  <a16:creationId xmlns:a16="http://schemas.microsoft.com/office/drawing/2014/main" id="{0D8DA84B-3368-812B-D189-FD80BB3474FA}"/>
-                </a:ext>
-              </a:extLst>
-            </p:cNvPr>
-            <p:cNvSpPr txBox="1">
-              <a:spLocks/>
-            </p:cNvSpPr>
-            <p:nvPr/>
-          </p:nvSpPr>
-          <p:spPr>
-            <a:xfrm>
-              <a:off x="844956" y="4737805"/>
-              <a:ext cx="8086567" cy="10217294"/>
-            </a:xfrm>
-            <a:prstGeom prst="rect">
-              <a:avLst/>
-            </a:prstGeom>
-          </p:spPr>
-          <p:txBody>
-            <a:bodyPr/>
-            <a:lstStyle>
-              <a:lvl1pPr marL="685800" indent="-685800" algn="l" defTabSz="2743200" rtl="0" eaLnBrk="1" latinLnBrk="0" hangingPunct="1">
-                <a:lnSpc>
-                  <a:spcPct val="90000"/>
-                </a:lnSpc>
-                <a:spcBef>
-                  <a:spcPts val="3000"/>
-                </a:spcBef>
-                <a:buFont typeface="Arial" panose="020B0604020202020204" pitchFamily="34" charset="0"/>
-                <a:buChar char="•"/>
-                <a:defRPr sz="8400" kern="1200">
-                  <a:solidFill>
-                    <a:schemeClr val="tx1"/>
-                  </a:solidFill>
-                  <a:latin typeface="+mn-lt"/>
-                  <a:ea typeface="+mn-ea"/>
-                  <a:cs typeface="+mn-cs"/>
-                </a:defRPr>
-              </a:lvl1pPr>
-              <a:lvl2pPr marL="2057400" indent="-685800" algn="l" defTabSz="2743200" rtl="0" eaLnBrk="1" latinLnBrk="0" hangingPunct="1">
-                <a:lnSpc>
-                  <a:spcPct val="90000"/>
-                </a:lnSpc>
-                <a:spcBef>
-                  <a:spcPts val="1500"/>
-                </a:spcBef>
-                <a:buFont typeface="Arial" panose="020B0604020202020204" pitchFamily="34" charset="0"/>
-                <a:buChar char="•"/>
-                <a:defRPr sz="7200" kern="1200">
-                  <a:solidFill>
-                    <a:schemeClr val="tx1"/>
-                  </a:solidFill>
-                  <a:latin typeface="+mn-lt"/>
-                  <a:ea typeface="+mn-ea"/>
-                  <a:cs typeface="+mn-cs"/>
-                </a:defRPr>
-              </a:lvl2pPr>
-              <a:lvl3pPr marL="3429000" indent="-685800" algn="l" defTabSz="2743200" rtl="0" eaLnBrk="1" latinLnBrk="0" hangingPunct="1">
-                <a:lnSpc>
-                  <a:spcPct val="90000"/>
-                </a:lnSpc>
-                <a:spcBef>
-                  <a:spcPts val="1500"/>
-                </a:spcBef>
-                <a:buFont typeface="Arial" panose="020B0604020202020204" pitchFamily="34" charset="0"/>
-                <a:buChar char="•"/>
-                <a:defRPr sz="6000" kern="1200">
-                  <a:solidFill>
-                    <a:schemeClr val="tx1"/>
-                  </a:solidFill>
-                  <a:latin typeface="+mn-lt"/>
-                  <a:ea typeface="+mn-ea"/>
-                  <a:cs typeface="+mn-cs"/>
-                </a:defRPr>
-              </a:lvl3pPr>
-              <a:lvl4pPr marL="4800600" indent="-685800" algn="l" defTabSz="2743200" rtl="0" eaLnBrk="1" latinLnBrk="0" hangingPunct="1">
-                <a:lnSpc>
-                  <a:spcPct val="90000"/>
-                </a:lnSpc>
-                <a:spcBef>
-                  <a:spcPts val="1500"/>
-                </a:spcBef>
-                <a:buFont typeface="Arial" panose="020B0604020202020204" pitchFamily="34" charset="0"/>
-                <a:buChar char="•"/>
-                <a:defRPr sz="5400" kern="1200">
-                  <a:solidFill>
-                    <a:schemeClr val="tx1"/>
-                  </a:solidFill>
-                  <a:latin typeface="+mn-lt"/>
-                  <a:ea typeface="+mn-ea"/>
-                  <a:cs typeface="+mn-cs"/>
-                </a:defRPr>
-              </a:lvl4pPr>
-              <a:lvl5pPr marL="6172200" indent="-685800" algn="l" defTabSz="2743200" rtl="0" eaLnBrk="1" latinLnBrk="0" hangingPunct="1">
-                <a:lnSpc>
-                  <a:spcPct val="90000"/>
-                </a:lnSpc>
-                <a:spcBef>
-                  <a:spcPts val="1500"/>
-                </a:spcBef>
-                <a:buFont typeface="Arial" panose="020B0604020202020204" pitchFamily="34" charset="0"/>
-                <a:buChar char="•"/>
-                <a:defRPr sz="5400" kern="1200">
-                  <a:solidFill>
-                    <a:schemeClr val="tx1"/>
-                  </a:solidFill>
-                  <a:latin typeface="+mn-lt"/>
-                  <a:ea typeface="+mn-ea"/>
-                  <a:cs typeface="+mn-cs"/>
-                </a:defRPr>
-              </a:lvl5pPr>
-              <a:lvl6pPr marL="7543800" indent="-685800" algn="l" defTabSz="2743200" rtl="0" eaLnBrk="1" latinLnBrk="0" hangingPunct="1">
-                <a:lnSpc>
-                  <a:spcPct val="90000"/>
-                </a:lnSpc>
-                <a:spcBef>
-                  <a:spcPts val="1500"/>
-                </a:spcBef>
-                <a:buFont typeface="Arial" panose="020B0604020202020204" pitchFamily="34" charset="0"/>
-                <a:buChar char="•"/>
-                <a:defRPr sz="5400" kern="1200">
-                  <a:solidFill>
-                    <a:schemeClr val="tx1"/>
-                  </a:solidFill>
-                  <a:latin typeface="+mn-lt"/>
-                  <a:ea typeface="+mn-ea"/>
-                  <a:cs typeface="+mn-cs"/>
-                </a:defRPr>
-              </a:lvl6pPr>
-              <a:lvl7pPr marL="8915400" indent="-685800" algn="l" defTabSz="2743200" rtl="0" eaLnBrk="1" latinLnBrk="0" hangingPunct="1">
-                <a:lnSpc>
-                  <a:spcPct val="90000"/>
-                </a:lnSpc>
-                <a:spcBef>
-                  <a:spcPts val="1500"/>
-                </a:spcBef>
-                <a:buFont typeface="Arial" panose="020B0604020202020204" pitchFamily="34" charset="0"/>
-                <a:buChar char="•"/>
-                <a:defRPr sz="5400" kern="1200">
-                  <a:solidFill>
-                    <a:schemeClr val="tx1"/>
-                  </a:solidFill>
-                  <a:latin typeface="+mn-lt"/>
-                  <a:ea typeface="+mn-ea"/>
-                  <a:cs typeface="+mn-cs"/>
-                </a:defRPr>
-              </a:lvl7pPr>
-              <a:lvl8pPr marL="10287000" indent="-685800" algn="l" defTabSz="2743200" rtl="0" eaLnBrk="1" latinLnBrk="0" hangingPunct="1">
-                <a:lnSpc>
-                  <a:spcPct val="90000"/>
-                </a:lnSpc>
-                <a:spcBef>
-                  <a:spcPts val="1500"/>
-                </a:spcBef>
-                <a:buFont typeface="Arial" panose="020B0604020202020204" pitchFamily="34" charset="0"/>
-                <a:buChar char="•"/>
-                <a:defRPr sz="5400" kern="1200">
-                  <a:solidFill>
-                    <a:schemeClr val="tx1"/>
-                  </a:solidFill>
-                  <a:latin typeface="+mn-lt"/>
-                  <a:ea typeface="+mn-ea"/>
-                  <a:cs typeface="+mn-cs"/>
-                </a:defRPr>
-              </a:lvl8pPr>
-              <a:lvl9pPr marL="11658600" indent="-685800" algn="l" defTabSz="2743200" rtl="0" eaLnBrk="1" latinLnBrk="0" hangingPunct="1">
-                <a:lnSpc>
-                  <a:spcPct val="90000"/>
-                </a:lnSpc>
-                <a:spcBef>
-                  <a:spcPts val="1500"/>
-                </a:spcBef>
-                <a:buFont typeface="Arial" panose="020B0604020202020204" pitchFamily="34" charset="0"/>
-                <a:buChar char="•"/>
-                <a:defRPr sz="5400" kern="1200">
-                  <a:solidFill>
-                    <a:schemeClr val="tx1"/>
-                  </a:solidFill>
-                  <a:latin typeface="+mn-lt"/>
-                  <a:ea typeface="+mn-ea"/>
-                  <a:cs typeface="+mn-cs"/>
-                </a:defRPr>
-              </a:lvl9pPr>
-            </a:lstStyle>
-            <a:p>
-              <a:pPr marL="0" indent="0" fontAlgn="auto">
-                <a:spcAft>
-                  <a:spcPts val="0"/>
-                </a:spcAft>
-                <a:buNone/>
-              </a:pPr>
-              <a:r>
-                <a:rPr lang="en-US" sz="3200" dirty="0">
-                  <a:latin typeface="Palatino Linotype" panose="02040502050505030304" pitchFamily="18" charset="0"/>
-                  <a:cs typeface="NVIDIA Sans" panose="020B0503020203020204" pitchFamily="34" charset="0"/>
-                </a:rPr>
-                <a:t>Describe the control method(s) you are using.</a:t>
-              </a:r>
-            </a:p>
-            <a:p>
-              <a:pPr marL="0" indent="0" fontAlgn="auto">
-                <a:spcAft>
-                  <a:spcPts val="0"/>
-                </a:spcAft>
-                <a:buNone/>
-              </a:pPr>
-              <a:r>
-                <a:rPr lang="en-US" sz="3200" dirty="0">
-                  <a:latin typeface="Palatino Linotype" panose="02040502050505030304" pitchFamily="18" charset="0"/>
-                  <a:cs typeface="NVIDIA Sans" panose="020B0503020203020204" pitchFamily="34" charset="0"/>
-                </a:rPr>
-                <a:t>Explain the design choices behind your approach</a:t>
-              </a:r>
-            </a:p>
-            <a:p>
-              <a:pPr marL="0" indent="0" fontAlgn="auto">
-                <a:spcAft>
-                  <a:spcPts val="0"/>
-                </a:spcAft>
-                <a:buNone/>
-              </a:pPr>
-              <a:r>
-                <a:rPr lang="en-US" sz="3200" dirty="0">
-                  <a:latin typeface="Palatino Linotype" panose="02040502050505030304" pitchFamily="18" charset="0"/>
-                  <a:cs typeface="NVIDIA Sans" panose="020B0503020203020204" pitchFamily="34" charset="0"/>
-                </a:rPr>
-                <a:t>Figures!</a:t>
-              </a:r>
-            </a:p>
-            <a:p>
-              <a:pPr marL="0" indent="0" fontAlgn="auto">
-                <a:spcAft>
-                  <a:spcPts val="0"/>
-                </a:spcAft>
-                <a:buNone/>
-              </a:pPr>
-              <a:endParaRPr lang="en-US" sz="2400" dirty="0">
-                <a:latin typeface="Palatino Linotype" panose="02040502050505030304" pitchFamily="18" charset="0"/>
-                <a:cs typeface="NVIDIA Sans" panose="020B0503020203020204" pitchFamily="34" charset="0"/>
-              </a:endParaRPr>
-            </a:p>
-            <a:p>
-              <a:pPr marL="0" indent="0" fontAlgn="auto">
-                <a:spcAft>
-                  <a:spcPts val="0"/>
-                </a:spcAft>
-                <a:buNone/>
-              </a:pPr>
-              <a:endParaRPr lang="en-US" sz="2400" dirty="0">
-                <a:latin typeface="Palatino Linotype" panose="02040502050505030304" pitchFamily="18" charset="0"/>
-                <a:cs typeface="NVIDIA Sans" panose="020B0503020203020204" pitchFamily="34" charset="0"/>
-              </a:endParaRPr>
-            </a:p>
-            <a:p>
-              <a:pPr marL="0" indent="0" fontAlgn="auto">
-                <a:spcAft>
-                  <a:spcPts val="0"/>
-                </a:spcAft>
-                <a:buNone/>
-              </a:pPr>
-              <a:endParaRPr lang="en-US" sz="2400" dirty="0">
-                <a:latin typeface="Palatino Linotype" panose="02040502050505030304" pitchFamily="18" charset="0"/>
-                <a:cs typeface="NVIDIA Sans" panose="020B0503020203020204" pitchFamily="34" charset="0"/>
-              </a:endParaRPr>
-            </a:p>
-            <a:p>
-              <a:pPr marL="0" indent="0" fontAlgn="auto">
-                <a:spcAft>
-                  <a:spcPts val="0"/>
-                </a:spcAft>
-                <a:buNone/>
-              </a:pPr>
-              <a:endParaRPr lang="en-US" sz="2400" dirty="0">
-                <a:latin typeface="Palatino Linotype" panose="02040502050505030304" pitchFamily="18" charset="0"/>
-                <a:cs typeface="NVIDIA Sans" panose="020B0503020203020204" pitchFamily="34" charset="0"/>
-              </a:endParaRPr>
-            </a:p>
-          </p:txBody>
-        </p:sp>
+        <mc:AlternateContent xmlns:mc="http://schemas.openxmlformats.org/markup-compatibility/2006">
+          <mc:Choice xmlns:a14="http://schemas.microsoft.com/office/drawing/2010/main" Requires="a14">
+            <p:sp>
+              <p:nvSpPr>
+                <p:cNvPr id="78" name="Text Placeholder 35">
+                  <a:extLst>
+                    <a:ext uri="{FF2B5EF4-FFF2-40B4-BE49-F238E27FC236}">
+                      <a16:creationId xmlns:a16="http://schemas.microsoft.com/office/drawing/2014/main" id="{0D8DA84B-3368-812B-D189-FD80BB3474FA}"/>
+                    </a:ext>
+                  </a:extLst>
+                </p:cNvPr>
+                <p:cNvSpPr txBox="1">
+                  <a:spLocks/>
+                </p:cNvSpPr>
+                <p:nvPr/>
+              </p:nvSpPr>
+              <p:spPr>
+                <a:xfrm>
+                  <a:off x="844956" y="4362930"/>
+                  <a:ext cx="8086567" cy="10592169"/>
+                </a:xfrm>
+                <a:prstGeom prst="rect">
+                  <a:avLst/>
+                </a:prstGeom>
+              </p:spPr>
+              <p:txBody>
+                <a:bodyPr/>
+                <a:lstStyle>
+                  <a:lvl1pPr marL="685800" indent="-685800" algn="l" defTabSz="2743200" rtl="0" eaLnBrk="1" latinLnBrk="0" hangingPunct="1">
+                    <a:lnSpc>
+                      <a:spcPct val="90000"/>
+                    </a:lnSpc>
+                    <a:spcBef>
+                      <a:spcPts val="3000"/>
+                    </a:spcBef>
+                    <a:buFont typeface="Arial" panose="020B0604020202020204" pitchFamily="34" charset="0"/>
+                    <a:buChar char="•"/>
+                    <a:defRPr sz="8400" kern="1200">
+                      <a:solidFill>
+                        <a:schemeClr val="tx1"/>
+                      </a:solidFill>
+                      <a:latin typeface="+mn-lt"/>
+                      <a:ea typeface="+mn-ea"/>
+                      <a:cs typeface="+mn-cs"/>
+                    </a:defRPr>
+                  </a:lvl1pPr>
+                  <a:lvl2pPr marL="2057400" indent="-685800" algn="l" defTabSz="2743200" rtl="0" eaLnBrk="1" latinLnBrk="0" hangingPunct="1">
+                    <a:lnSpc>
+                      <a:spcPct val="90000"/>
+                    </a:lnSpc>
+                    <a:spcBef>
+                      <a:spcPts val="1500"/>
+                    </a:spcBef>
+                    <a:buFont typeface="Arial" panose="020B0604020202020204" pitchFamily="34" charset="0"/>
+                    <a:buChar char="•"/>
+                    <a:defRPr sz="7200" kern="1200">
+                      <a:solidFill>
+                        <a:schemeClr val="tx1"/>
+                      </a:solidFill>
+                      <a:latin typeface="+mn-lt"/>
+                      <a:ea typeface="+mn-ea"/>
+                      <a:cs typeface="+mn-cs"/>
+                    </a:defRPr>
+                  </a:lvl2pPr>
+                  <a:lvl3pPr marL="3429000" indent="-685800" algn="l" defTabSz="2743200" rtl="0" eaLnBrk="1" latinLnBrk="0" hangingPunct="1">
+                    <a:lnSpc>
+                      <a:spcPct val="90000"/>
+                    </a:lnSpc>
+                    <a:spcBef>
+                      <a:spcPts val="1500"/>
+                    </a:spcBef>
+                    <a:buFont typeface="Arial" panose="020B0604020202020204" pitchFamily="34" charset="0"/>
+                    <a:buChar char="•"/>
+                    <a:defRPr sz="6000" kern="1200">
+                      <a:solidFill>
+                        <a:schemeClr val="tx1"/>
+                      </a:solidFill>
+                      <a:latin typeface="+mn-lt"/>
+                      <a:ea typeface="+mn-ea"/>
+                      <a:cs typeface="+mn-cs"/>
+                    </a:defRPr>
+                  </a:lvl3pPr>
+                  <a:lvl4pPr marL="4800600" indent="-685800" algn="l" defTabSz="2743200" rtl="0" eaLnBrk="1" latinLnBrk="0" hangingPunct="1">
+                    <a:lnSpc>
+                      <a:spcPct val="90000"/>
+                    </a:lnSpc>
+                    <a:spcBef>
+                      <a:spcPts val="1500"/>
+                    </a:spcBef>
+                    <a:buFont typeface="Arial" panose="020B0604020202020204" pitchFamily="34" charset="0"/>
+                    <a:buChar char="•"/>
+                    <a:defRPr sz="5400" kern="1200">
+                      <a:solidFill>
+                        <a:schemeClr val="tx1"/>
+                      </a:solidFill>
+                      <a:latin typeface="+mn-lt"/>
+                      <a:ea typeface="+mn-ea"/>
+                      <a:cs typeface="+mn-cs"/>
+                    </a:defRPr>
+                  </a:lvl4pPr>
+                  <a:lvl5pPr marL="6172200" indent="-685800" algn="l" defTabSz="2743200" rtl="0" eaLnBrk="1" latinLnBrk="0" hangingPunct="1">
+                    <a:lnSpc>
+                      <a:spcPct val="90000"/>
+                    </a:lnSpc>
+                    <a:spcBef>
+                      <a:spcPts val="1500"/>
+                    </a:spcBef>
+                    <a:buFont typeface="Arial" panose="020B0604020202020204" pitchFamily="34" charset="0"/>
+                    <a:buChar char="•"/>
+                    <a:defRPr sz="5400" kern="1200">
+                      <a:solidFill>
+                        <a:schemeClr val="tx1"/>
+                      </a:solidFill>
+                      <a:latin typeface="+mn-lt"/>
+                      <a:ea typeface="+mn-ea"/>
+                      <a:cs typeface="+mn-cs"/>
+                    </a:defRPr>
+                  </a:lvl5pPr>
+                  <a:lvl6pPr marL="7543800" indent="-685800" algn="l" defTabSz="2743200" rtl="0" eaLnBrk="1" latinLnBrk="0" hangingPunct="1">
+                    <a:lnSpc>
+                      <a:spcPct val="90000"/>
+                    </a:lnSpc>
+                    <a:spcBef>
+                      <a:spcPts val="1500"/>
+                    </a:spcBef>
+                    <a:buFont typeface="Arial" panose="020B0604020202020204" pitchFamily="34" charset="0"/>
+                    <a:buChar char="•"/>
+                    <a:defRPr sz="5400" kern="1200">
+                      <a:solidFill>
+                        <a:schemeClr val="tx1"/>
+                      </a:solidFill>
+                      <a:latin typeface="+mn-lt"/>
+                      <a:ea typeface="+mn-ea"/>
+                      <a:cs typeface="+mn-cs"/>
+                    </a:defRPr>
+                  </a:lvl6pPr>
+                  <a:lvl7pPr marL="8915400" indent="-685800" algn="l" defTabSz="2743200" rtl="0" eaLnBrk="1" latinLnBrk="0" hangingPunct="1">
+                    <a:lnSpc>
+                      <a:spcPct val="90000"/>
+                    </a:lnSpc>
+                    <a:spcBef>
+                      <a:spcPts val="1500"/>
+                    </a:spcBef>
+                    <a:buFont typeface="Arial" panose="020B0604020202020204" pitchFamily="34" charset="0"/>
+                    <a:buChar char="•"/>
+                    <a:defRPr sz="5400" kern="1200">
+                      <a:solidFill>
+                        <a:schemeClr val="tx1"/>
+                      </a:solidFill>
+                      <a:latin typeface="+mn-lt"/>
+                      <a:ea typeface="+mn-ea"/>
+                      <a:cs typeface="+mn-cs"/>
+                    </a:defRPr>
+                  </a:lvl7pPr>
+                  <a:lvl8pPr marL="10287000" indent="-685800" algn="l" defTabSz="2743200" rtl="0" eaLnBrk="1" latinLnBrk="0" hangingPunct="1">
+                    <a:lnSpc>
+                      <a:spcPct val="90000"/>
+                    </a:lnSpc>
+                    <a:spcBef>
+                      <a:spcPts val="1500"/>
+                    </a:spcBef>
+                    <a:buFont typeface="Arial" panose="020B0604020202020204" pitchFamily="34" charset="0"/>
+                    <a:buChar char="•"/>
+                    <a:defRPr sz="5400" kern="1200">
+                      <a:solidFill>
+                        <a:schemeClr val="tx1"/>
+                      </a:solidFill>
+                      <a:latin typeface="+mn-lt"/>
+                      <a:ea typeface="+mn-ea"/>
+                      <a:cs typeface="+mn-cs"/>
+                    </a:defRPr>
+                  </a:lvl8pPr>
+                  <a:lvl9pPr marL="11658600" indent="-685800" algn="l" defTabSz="2743200" rtl="0" eaLnBrk="1" latinLnBrk="0" hangingPunct="1">
+                    <a:lnSpc>
+                      <a:spcPct val="90000"/>
+                    </a:lnSpc>
+                    <a:spcBef>
+                      <a:spcPts val="1500"/>
+                    </a:spcBef>
+                    <a:buFont typeface="Arial" panose="020B0604020202020204" pitchFamily="34" charset="0"/>
+                    <a:buChar char="•"/>
+                    <a:defRPr sz="5400" kern="1200">
+                      <a:solidFill>
+                        <a:schemeClr val="tx1"/>
+                      </a:solidFill>
+                      <a:latin typeface="+mn-lt"/>
+                      <a:ea typeface="+mn-ea"/>
+                      <a:cs typeface="+mn-cs"/>
+                    </a:defRPr>
+                  </a:lvl9pPr>
+                </a:lstStyle>
+                <a:p>
+                  <a:pPr marL="0" indent="0" fontAlgn="auto">
+                    <a:spcAft>
+                      <a:spcPts val="0"/>
+                    </a:spcAft>
+                    <a:buNone/>
+                  </a:pPr>
+                  <a:r>
+                    <a:rPr lang="en-US" sz="3200" dirty="0">
+                      <a:latin typeface="Palatino Linotype" panose="02040502050505030304" pitchFamily="18" charset="0"/>
+                      <a:cs typeface="NVIDIA Sans" panose="020B0503020203020204" pitchFamily="34" charset="0"/>
+                    </a:rPr>
+                    <a:t>To guarantee safety under bounded stochastic wind disturbances, a backward reachable tube (BRT) is computed using Hamilton–Jacobi (HJ) analysis. </a:t>
+                  </a:r>
+                  <a14:m>
+                    <m:oMath xmlns:m="http://schemas.openxmlformats.org/officeDocument/2006/math">
+                      <m:r>
+                        <a:rPr lang="en-US" sz="3200" b="0" i="0" smtClean="0">
+                          <a:latin typeface="Cambria Math" panose="02040503050406030204" pitchFamily="18" charset="0"/>
+                          <a:cs typeface="NVIDIA Sans" panose="020B0503020203020204" pitchFamily="34" charset="0"/>
+                        </a:rPr>
+                        <m:t> </m:t>
+                      </m:r>
+                      <m:r>
+                        <a:rPr lang="en-US" sz="3200" b="0" i="1" smtClean="0">
+                          <a:latin typeface="Cambria Math" panose="02040503050406030204" pitchFamily="18" charset="0"/>
+                          <a:cs typeface="NVIDIA Sans" panose="020B0503020203020204" pitchFamily="34" charset="0"/>
+                        </a:rPr>
+                        <m:t>𝑉</m:t>
+                      </m:r>
+                      <m:r>
+                        <a:rPr lang="en-US" sz="3200" b="0" i="1" smtClean="0">
+                          <a:latin typeface="Cambria Math" panose="02040503050406030204" pitchFamily="18" charset="0"/>
+                          <a:cs typeface="NVIDIA Sans" panose="020B0503020203020204" pitchFamily="34" charset="0"/>
+                        </a:rPr>
+                        <m:t>(</m:t>
+                      </m:r>
+                      <m:r>
+                        <a:rPr lang="en-US" sz="3200" b="0" i="1" smtClean="0">
+                          <a:latin typeface="Cambria Math" panose="02040503050406030204" pitchFamily="18" charset="0"/>
+                          <a:cs typeface="NVIDIA Sans" panose="020B0503020203020204" pitchFamily="34" charset="0"/>
+                        </a:rPr>
+                        <m:t>𝑥</m:t>
+                      </m:r>
+                      <m:r>
+                        <a:rPr lang="en-US" sz="3200" b="0" i="1" smtClean="0">
+                          <a:latin typeface="Cambria Math" panose="02040503050406030204" pitchFamily="18" charset="0"/>
+                          <a:cs typeface="NVIDIA Sans" panose="020B0503020203020204" pitchFamily="34" charset="0"/>
+                        </a:rPr>
+                        <m:t>,</m:t>
+                      </m:r>
+                      <m:r>
+                        <a:rPr lang="en-US" sz="3200" b="0" i="1" smtClean="0">
+                          <a:latin typeface="Cambria Math" panose="02040503050406030204" pitchFamily="18" charset="0"/>
+                          <a:cs typeface="NVIDIA Sans" panose="020B0503020203020204" pitchFamily="34" charset="0"/>
+                        </a:rPr>
+                        <m:t>𝑡</m:t>
+                      </m:r>
+                      <m:r>
+                        <a:rPr lang="en-US" sz="3200" b="0" i="1" smtClean="0">
+                          <a:latin typeface="Cambria Math" panose="02040503050406030204" pitchFamily="18" charset="0"/>
+                          <a:cs typeface="NVIDIA Sans" panose="020B0503020203020204" pitchFamily="34" charset="0"/>
+                        </a:rPr>
+                        <m:t>)</m:t>
+                      </m:r>
+                    </m:oMath>
+                  </a14:m>
+                  <a:r>
+                    <a:rPr lang="en-US" sz="3200" dirty="0">
+                      <a:latin typeface="Palatino Linotype" panose="02040502050505030304" pitchFamily="18" charset="0"/>
+                      <a:cs typeface="NVIDIA Sans" panose="020B0503020203020204" pitchFamily="34" charset="0"/>
+                    </a:rPr>
+                    <a:t> is the value function solving the HJ PDE:</a:t>
+                  </a:r>
+                </a:p>
+                <a:p>
+                  <a:pPr marL="0" indent="0" fontAlgn="auto">
+                    <a:spcAft>
+                      <a:spcPts val="0"/>
+                    </a:spcAft>
+                    <a:buNone/>
+                  </a:pPr>
+                  <a:endParaRPr lang="en-US" sz="3200" dirty="0">
+                    <a:latin typeface="Palatino Linotype" panose="02040502050505030304" pitchFamily="18" charset="0"/>
+                    <a:cs typeface="NVIDIA Sans" panose="020B0503020203020204" pitchFamily="34" charset="0"/>
+                  </a:endParaRPr>
+                </a:p>
+                <a:p>
+                  <a:pPr marL="0" indent="0" fontAlgn="auto">
+                    <a:spcAft>
+                      <a:spcPts val="0"/>
+                    </a:spcAft>
+                    <a:buNone/>
+                  </a:pPr>
+                  <a:r>
+                    <a:rPr lang="en-US" sz="3200" dirty="0">
+                      <a:latin typeface="Palatino Linotype" panose="02040502050505030304" pitchFamily="18" charset="0"/>
+                      <a:cs typeface="NVIDIA Sans" panose="020B0503020203020204" pitchFamily="34" charset="0"/>
+                    </a:rPr>
+                    <a:t>The sub-zero level set represents the set of states from which failure is inevitable:</a:t>
+                  </a:r>
+                </a:p>
+                <a:p>
+                  <a:pPr marL="0" indent="0" fontAlgn="auto">
+                    <a:spcAft>
+                      <a:spcPts val="0"/>
+                    </a:spcAft>
+                    <a:buNone/>
+                  </a:pPr>
+                  <a:endParaRPr lang="en-US" sz="3200" dirty="0">
+                    <a:latin typeface="Palatino Linotype" panose="02040502050505030304" pitchFamily="18" charset="0"/>
+                    <a:cs typeface="NVIDIA Sans" panose="020B0503020203020204" pitchFamily="34" charset="0"/>
+                  </a:endParaRPr>
+                </a:p>
+                <a:p>
+                  <a:pPr marL="0" indent="0" fontAlgn="auto">
+                    <a:spcAft>
+                      <a:spcPts val="0"/>
+                    </a:spcAft>
+                    <a:buNone/>
+                  </a:pPr>
+                  <a:endParaRPr lang="en-US" sz="3200" dirty="0">
+                    <a:latin typeface="Palatino Linotype" panose="02040502050505030304" pitchFamily="18" charset="0"/>
+                    <a:cs typeface="NVIDIA Sans" panose="020B0503020203020204" pitchFamily="34" charset="0"/>
+                  </a:endParaRPr>
+                </a:p>
+                <a:p>
+                  <a:pPr marL="0" indent="0" fontAlgn="auto">
+                    <a:spcAft>
+                      <a:spcPts val="0"/>
+                    </a:spcAft>
+                    <a:buNone/>
+                  </a:pPr>
+                  <a:endParaRPr lang="en-US" sz="3200" dirty="0">
+                    <a:latin typeface="Palatino Linotype" panose="02040502050505030304" pitchFamily="18" charset="0"/>
+                    <a:cs typeface="NVIDIA Sans" panose="020B0503020203020204" pitchFamily="34" charset="0"/>
+                  </a:endParaRPr>
+                </a:p>
+                <a:p>
+                  <a:pPr marL="0" indent="0" fontAlgn="auto">
+                    <a:spcAft>
+                      <a:spcPts val="0"/>
+                    </a:spcAft>
+                    <a:buNone/>
+                  </a:pPr>
+                  <a:endParaRPr lang="en-US" sz="3200" dirty="0">
+                    <a:latin typeface="Palatino Linotype" panose="02040502050505030304" pitchFamily="18" charset="0"/>
+                    <a:cs typeface="NVIDIA Sans" panose="020B0503020203020204" pitchFamily="34" charset="0"/>
+                  </a:endParaRPr>
+                </a:p>
+                <a:p>
+                  <a:pPr marL="0" indent="0" fontAlgn="auto">
+                    <a:spcAft>
+                      <a:spcPts val="0"/>
+                    </a:spcAft>
+                    <a:buNone/>
+                  </a:pPr>
+                  <a:endParaRPr lang="en-US" sz="3200" dirty="0">
+                    <a:latin typeface="Palatino Linotype" panose="02040502050505030304" pitchFamily="18" charset="0"/>
+                    <a:cs typeface="NVIDIA Sans" panose="020B0503020203020204" pitchFamily="34" charset="0"/>
+                  </a:endParaRPr>
+                </a:p>
+                <a:p>
+                  <a:pPr marL="0" indent="0" fontAlgn="auto">
+                    <a:spcAft>
+                      <a:spcPts val="0"/>
+                    </a:spcAft>
+                    <a:buNone/>
+                  </a:pPr>
+                  <a:r>
+                    <a:rPr lang="en-US" sz="3200" dirty="0">
+                      <a:latin typeface="Palatino Linotype" panose="02040502050505030304" pitchFamily="18" charset="0"/>
+                      <a:cs typeface="NVIDIA Sans" panose="020B0503020203020204" pitchFamily="34" charset="0"/>
+                    </a:rPr>
+                    <a:t>A CBF is then formulated using the HJ BRT:</a:t>
+                  </a:r>
+                </a:p>
+                <a:p>
+                  <a:pPr marL="0" indent="0" fontAlgn="auto">
+                    <a:spcAft>
+                      <a:spcPts val="0"/>
+                    </a:spcAft>
+                    <a:buNone/>
+                  </a:pPr>
+                  <a:endParaRPr lang="en-US" sz="3200" dirty="0">
+                    <a:latin typeface="Palatino Linotype" panose="02040502050505030304" pitchFamily="18" charset="0"/>
+                    <a:cs typeface="NVIDIA Sans" panose="020B0503020203020204" pitchFamily="34" charset="0"/>
+                  </a:endParaRPr>
+                </a:p>
+                <a:p>
+                  <a:pPr marL="0" indent="0" fontAlgn="auto">
+                    <a:spcAft>
+                      <a:spcPts val="0"/>
+                    </a:spcAft>
+                    <a:buNone/>
+                  </a:pPr>
+                  <a:r>
+                    <a:rPr lang="en-US" sz="3200" dirty="0">
+                      <a:latin typeface="Palatino Linotype" panose="02040502050505030304" pitchFamily="18" charset="0"/>
+                      <a:cs typeface="NVIDIA Sans" panose="020B0503020203020204" pitchFamily="34" charset="0"/>
+                    </a:rPr>
+                    <a:t>To ensure forward invariance:</a:t>
+                  </a:r>
+                </a:p>
+                <a:p>
+                  <a:pPr marL="0" indent="0" fontAlgn="auto">
+                    <a:spcAft>
+                      <a:spcPts val="0"/>
+                    </a:spcAft>
+                    <a:buNone/>
+                  </a:pPr>
+                  <a:endParaRPr lang="en-US" sz="3200" dirty="0">
+                    <a:latin typeface="Palatino Linotype" panose="02040502050505030304" pitchFamily="18" charset="0"/>
+                    <a:cs typeface="NVIDIA Sans" panose="020B0503020203020204" pitchFamily="34" charset="0"/>
+                  </a:endParaRPr>
+                </a:p>
+                <a:p>
+                  <a:pPr marL="0" indent="0" fontAlgn="auto">
+                    <a:spcAft>
+                      <a:spcPts val="0"/>
+                    </a:spcAft>
+                    <a:buNone/>
+                  </a:pPr>
+                  <a:r>
+                    <a:rPr lang="en-US" sz="3200" dirty="0">
+                      <a:latin typeface="Palatino Linotype" panose="02040502050505030304" pitchFamily="18" charset="0"/>
+                      <a:cs typeface="NVIDIA Sans" panose="020B0503020203020204" pitchFamily="34" charset="0"/>
+                    </a:rPr>
+                    <a:t>A QP is used to solve for the optimal input that keeps the system in the safe set that is close to a nominal PID-derived input:</a:t>
+                  </a:r>
+                </a:p>
+                <a:p>
+                  <a:pPr marL="0" indent="0" fontAlgn="auto">
+                    <a:spcAft>
+                      <a:spcPts val="0"/>
+                    </a:spcAft>
+                    <a:buNone/>
+                  </a:pPr>
+                  <a:endParaRPr lang="en-US" sz="3200" dirty="0">
+                    <a:latin typeface="Palatino Linotype" panose="02040502050505030304" pitchFamily="18" charset="0"/>
+                    <a:cs typeface="NVIDIA Sans" panose="020B0503020203020204" pitchFamily="34" charset="0"/>
+                  </a:endParaRPr>
+                </a:p>
+              </p:txBody>
+            </p:sp>
+          </mc:Choice>
+          <mc:Fallback>
+            <p:sp>
+              <p:nvSpPr>
+                <p:cNvPr id="78" name="Text Placeholder 35">
+                  <a:extLst>
+                    <a:ext uri="{FF2B5EF4-FFF2-40B4-BE49-F238E27FC236}">
+                      <a16:creationId xmlns:a16="http://schemas.microsoft.com/office/drawing/2014/main" id="{0D8DA84B-3368-812B-D189-FD80BB3474FA}"/>
+                    </a:ext>
+                  </a:extLst>
+                </p:cNvPr>
+                <p:cNvSpPr txBox="1">
+                  <a:spLocks noRot="1" noChangeAspect="1" noMove="1" noResize="1" noEditPoints="1" noAdjustHandles="1" noChangeArrowheads="1" noChangeShapeType="1" noTextEdit="1"/>
+                </p:cNvSpPr>
+                <p:nvPr/>
+              </p:nvSpPr>
+              <p:spPr>
+                <a:xfrm>
+                  <a:off x="844956" y="4362930"/>
+                  <a:ext cx="8086567" cy="10592169"/>
+                </a:xfrm>
+                <a:prstGeom prst="rect">
+                  <a:avLst/>
+                </a:prstGeom>
+                <a:blipFill>
+                  <a:blip r:embed="rId4"/>
+                  <a:stretch>
+                    <a:fillRect l="-1887" t="-767" r="-1730"/>
+                  </a:stretch>
+                </a:blipFill>
+              </p:spPr>
+              <p:txBody>
+                <a:bodyPr/>
+                <a:lstStyle/>
+                <a:p>
+                  <a:r>
+                    <a:rPr lang="fr-NL">
+                      <a:noFill/>
+                    </a:rPr>
+                    <a:t> </a:t>
+                  </a:r>
+                </a:p>
+              </p:txBody>
+            </p:sp>
+          </mc:Fallback>
+        </mc:AlternateContent>
         <p:sp>
           <p:nvSpPr>
             <p:cNvPr id="79" name="Rectangle 78">
@@ -13948,7 +13587,7 @@
         </p:nvGrpSpPr>
         <p:grpSpPr>
           <a:xfrm>
-            <a:off x="18464386" y="15445206"/>
+            <a:off x="18464386" y="15735285"/>
             <a:ext cx="8289737" cy="3876952"/>
             <a:chOff x="710253" y="3580243"/>
             <a:chExt cx="8312499" cy="3876952"/>
@@ -14417,39 +14056,8 @@
                   <a:latin typeface="Palatino Linotype" panose="02040502050505030304" pitchFamily="18" charset="0"/>
                   <a:cs typeface="NVIDIA Sans" panose="020B0503020203020204" pitchFamily="34" charset="0"/>
                 </a:rPr>
-                <a:t>Summarize work and findings</a:t>
+                <a:t>The PID-CBF controller exhibited very good behavior over the 20 second simulation time span, maintain a safe distance away from the safety constraints. Further analysis is needed to explain why the PID-HJ-CBF underperforms. </a:t>
               </a:r>
-            </a:p>
-            <a:p>
-              <a:pPr marL="0" indent="0" fontAlgn="auto">
-                <a:spcAft>
-                  <a:spcPts val="0"/>
-                </a:spcAft>
-                <a:buNone/>
-              </a:pPr>
-              <a:r>
-                <a:rPr lang="en-US" sz="3200" dirty="0">
-                  <a:latin typeface="Palatino Linotype" panose="02040502050505030304" pitchFamily="18" charset="0"/>
-                  <a:cs typeface="NVIDIA Sans" panose="020B0503020203020204" pitchFamily="34" charset="0"/>
-                </a:rPr>
-                <a:t>Ideas for future work or next steps or areas to improve on</a:t>
-              </a:r>
-              <a:endParaRPr lang="en-US" sz="2400" dirty="0">
-                <a:latin typeface="Palatino Linotype" panose="02040502050505030304" pitchFamily="18" charset="0"/>
-                <a:cs typeface="NVIDIA Sans" panose="020B0503020203020204" pitchFamily="34" charset="0"/>
-              </a:endParaRPr>
-            </a:p>
-            <a:p>
-              <a:pPr marL="0" indent="0" fontAlgn="auto">
-                <a:spcAft>
-                  <a:spcPts val="0"/>
-                </a:spcAft>
-                <a:buNone/>
-              </a:pPr>
-              <a:endParaRPr lang="en-US" sz="2400" dirty="0">
-                <a:latin typeface="Palatino Linotype" panose="02040502050505030304" pitchFamily="18" charset="0"/>
-                <a:cs typeface="NVIDIA Sans" panose="020B0503020203020204" pitchFamily="34" charset="0"/>
-              </a:endParaRPr>
             </a:p>
           </p:txBody>
         </p:sp>
@@ -14773,7 +14381,49 @@
               </a:spcAft>
               <a:buNone/>
             </a:pPr>
-            <a:endParaRPr lang="en-US" sz="2400" dirty="0">
+            <a:r>
+              <a:rPr lang="en-US" sz="2000" dirty="0">
+                <a:latin typeface="Palatino Linotype" panose="02040502050505030304" pitchFamily="18" charset="0"/>
+                <a:cs typeface="NVIDIA Sans" panose="020B0503020203020204" pitchFamily="34" charset="0"/>
+              </a:rPr>
+              <a:t>https://</a:t>
+            </a:r>
+            <a:r>
+              <a:rPr lang="en-US" sz="2000" dirty="0" err="1">
+                <a:latin typeface="Palatino Linotype" panose="02040502050505030304" pitchFamily="18" charset="0"/>
+                <a:cs typeface="NVIDIA Sans" panose="020B0503020203020204" pitchFamily="34" charset="0"/>
+              </a:rPr>
+              <a:t>uw-ctrl.github.io</a:t>
+            </a:r>
+            <a:r>
+              <a:rPr lang="en-US" sz="2000" dirty="0">
+                <a:latin typeface="Palatino Linotype" panose="02040502050505030304" pitchFamily="18" charset="0"/>
+                <a:cs typeface="NVIDIA Sans" panose="020B0503020203020204" pitchFamily="34" charset="0"/>
+              </a:rPr>
+              <a:t>/</a:t>
+            </a:r>
+            <a:r>
+              <a:rPr lang="en-US" sz="2000" dirty="0" err="1">
+                <a:latin typeface="Palatino Linotype" panose="02040502050505030304" pitchFamily="18" charset="0"/>
+                <a:cs typeface="NVIDIA Sans" panose="020B0503020203020204" pitchFamily="34" charset="0"/>
+              </a:rPr>
+              <a:t>lmc</a:t>
+            </a:r>
+            <a:r>
+              <a:rPr lang="en-US" sz="2000" dirty="0">
+                <a:latin typeface="Palatino Linotype" panose="02040502050505030304" pitchFamily="18" charset="0"/>
+                <a:cs typeface="NVIDIA Sans" panose="020B0503020203020204" pitchFamily="34" charset="0"/>
+              </a:rPr>
+              <a:t>-book/lectures/</a:t>
+            </a:r>
+            <a:r>
+              <a:rPr lang="en-US" sz="2000" dirty="0" err="1">
+                <a:latin typeface="Palatino Linotype" panose="02040502050505030304" pitchFamily="18" charset="0"/>
+                <a:cs typeface="NVIDIA Sans" panose="020B0503020203020204" pitchFamily="34" charset="0"/>
+              </a:rPr>
+              <a:t>reachability.html</a:t>
+            </a:r>
+            <a:endParaRPr lang="en-US" sz="2000" dirty="0">
               <a:latin typeface="Palatino Linotype" panose="02040502050505030304" pitchFamily="18" charset="0"/>
               <a:cs typeface="NVIDIA Sans" panose="020B0503020203020204" pitchFamily="34" charset="0"/>
             </a:endParaRPr>
@@ -14790,8 +14440,263 @@
               <a:cs typeface="NVIDIA Sans" panose="020B0503020203020204" pitchFamily="34" charset="0"/>
             </a:endParaRPr>
           </a:p>
+          <a:p>
+            <a:pPr marL="0" indent="0" fontAlgn="auto">
+              <a:spcAft>
+                <a:spcPts val="0"/>
+              </a:spcAft>
+              <a:buNone/>
+            </a:pPr>
+            <a:endParaRPr lang="en-US" sz="2400" dirty="0">
+              <a:latin typeface="Palatino Linotype" panose="02040502050505030304" pitchFamily="18" charset="0"/>
+              <a:cs typeface="NVIDIA Sans" panose="020B0503020203020204" pitchFamily="34" charset="0"/>
+            </a:endParaRPr>
+          </a:p>
         </p:txBody>
       </p:sp>
+      <p:pic>
+        <p:nvPicPr>
+          <p:cNvPr id="4" name="Image 3">
+            <a:extLst>
+              <a:ext uri="{FF2B5EF4-FFF2-40B4-BE49-F238E27FC236}">
+                <a16:creationId xmlns:a16="http://schemas.microsoft.com/office/drawing/2014/main" id="{65CDAAD8-B759-444E-8609-E2746A909539}"/>
+              </a:ext>
+            </a:extLst>
+          </p:cNvPr>
+          <p:cNvPicPr>
+            <a:picLocks noChangeAspect="1"/>
+          </p:cNvPicPr>
+          <p:nvPr/>
+        </p:nvPicPr>
+        <p:blipFill>
+          <a:blip r:embed="rId5"/>
+          <a:stretch>
+            <a:fillRect/>
+          </a:stretch>
+        </p:blipFill>
+        <p:spPr>
+          <a:xfrm>
+            <a:off x="3898798" y="16756274"/>
+            <a:ext cx="5045035" cy="4590743"/>
+          </a:xfrm>
+          <a:prstGeom prst="rect">
+            <a:avLst/>
+          </a:prstGeom>
+        </p:spPr>
+      </p:pic>
+      <p:pic>
+        <p:nvPicPr>
+          <p:cNvPr id="13" name="Image 12">
+            <a:extLst>
+              <a:ext uri="{FF2B5EF4-FFF2-40B4-BE49-F238E27FC236}">
+                <a16:creationId xmlns:a16="http://schemas.microsoft.com/office/drawing/2014/main" id="{2611087E-D85B-C843-8071-24177B351DDE}"/>
+              </a:ext>
+            </a:extLst>
+          </p:cNvPr>
+          <p:cNvPicPr>
+            <a:picLocks noChangeAspect="1"/>
+          </p:cNvPicPr>
+          <p:nvPr/>
+        </p:nvPicPr>
+        <p:blipFill>
+          <a:blip r:embed="rId6"/>
+          <a:stretch>
+            <a:fillRect/>
+          </a:stretch>
+        </p:blipFill>
+        <p:spPr>
+          <a:xfrm>
+            <a:off x="9645276" y="7269420"/>
+            <a:ext cx="8132523" cy="760236"/>
+          </a:xfrm>
+          <a:prstGeom prst="rect">
+            <a:avLst/>
+          </a:prstGeom>
+        </p:spPr>
+      </p:pic>
+      <p:pic>
+        <p:nvPicPr>
+          <p:cNvPr id="14" name="Image 13">
+            <a:extLst>
+              <a:ext uri="{FF2B5EF4-FFF2-40B4-BE49-F238E27FC236}">
+                <a16:creationId xmlns:a16="http://schemas.microsoft.com/office/drawing/2014/main" id="{925F6F5C-37E5-1F46-99AE-F5BD8C6A71A1}"/>
+              </a:ext>
+            </a:extLst>
+          </p:cNvPr>
+          <p:cNvPicPr>
+            <a:picLocks noChangeAspect="1"/>
+          </p:cNvPicPr>
+          <p:nvPr/>
+        </p:nvPicPr>
+        <p:blipFill>
+          <a:blip r:embed="rId7"/>
+          <a:stretch>
+            <a:fillRect/>
+          </a:stretch>
+        </p:blipFill>
+        <p:spPr>
+          <a:xfrm>
+            <a:off x="12023334" y="9158986"/>
+            <a:ext cx="3340100" cy="673100"/>
+          </a:xfrm>
+          <a:prstGeom prst="rect">
+            <a:avLst/>
+          </a:prstGeom>
+        </p:spPr>
+      </p:pic>
+      <p:pic>
+        <p:nvPicPr>
+          <p:cNvPr id="15" name="Image 14">
+            <a:extLst>
+              <a:ext uri="{FF2B5EF4-FFF2-40B4-BE49-F238E27FC236}">
+                <a16:creationId xmlns:a16="http://schemas.microsoft.com/office/drawing/2014/main" id="{2027A762-32A7-FC41-B6DF-5B8AD32C84A8}"/>
+              </a:ext>
+            </a:extLst>
+          </p:cNvPr>
+          <p:cNvPicPr>
+            <a:picLocks noChangeAspect="1"/>
+          </p:cNvPicPr>
+          <p:nvPr/>
+        </p:nvPicPr>
+        <p:blipFill>
+          <a:blip r:embed="rId8"/>
+          <a:stretch>
+            <a:fillRect/>
+          </a:stretch>
+        </p:blipFill>
+        <p:spPr>
+          <a:xfrm>
+            <a:off x="12504649" y="14303387"/>
+            <a:ext cx="2438400" cy="520700"/>
+          </a:xfrm>
+          <a:prstGeom prst="rect">
+            <a:avLst/>
+          </a:prstGeom>
+        </p:spPr>
+      </p:pic>
+      <p:pic>
+        <p:nvPicPr>
+          <p:cNvPr id="17" name="Image 16">
+            <a:extLst>
+              <a:ext uri="{FF2B5EF4-FFF2-40B4-BE49-F238E27FC236}">
+                <a16:creationId xmlns:a16="http://schemas.microsoft.com/office/drawing/2014/main" id="{E49FB222-39CE-A247-90F2-34A109DE64F3}"/>
+              </a:ext>
+            </a:extLst>
+          </p:cNvPr>
+          <p:cNvPicPr>
+            <a:picLocks noChangeAspect="1"/>
+          </p:cNvPicPr>
+          <p:nvPr/>
+        </p:nvPicPr>
+        <p:blipFill>
+          <a:blip r:embed="rId9"/>
+          <a:stretch>
+            <a:fillRect/>
+          </a:stretch>
+        </p:blipFill>
+        <p:spPr>
+          <a:xfrm>
+            <a:off x="11007725" y="15930353"/>
+            <a:ext cx="5473700" cy="584200"/>
+          </a:xfrm>
+          <a:prstGeom prst="rect">
+            <a:avLst/>
+          </a:prstGeom>
+        </p:spPr>
+      </p:pic>
+      <p:pic>
+        <p:nvPicPr>
+          <p:cNvPr id="22" name="Image 21">
+            <a:extLst>
+              <a:ext uri="{FF2B5EF4-FFF2-40B4-BE49-F238E27FC236}">
+                <a16:creationId xmlns:a16="http://schemas.microsoft.com/office/drawing/2014/main" id="{17C4444C-D2D5-204F-B018-72FC5CCBA43D}"/>
+              </a:ext>
+            </a:extLst>
+          </p:cNvPr>
+          <p:cNvPicPr>
+            <a:picLocks noChangeAspect="1"/>
+          </p:cNvPicPr>
+          <p:nvPr/>
+        </p:nvPicPr>
+        <p:blipFill>
+          <a:blip r:embed="rId10"/>
+          <a:stretch>
+            <a:fillRect/>
+          </a:stretch>
+        </p:blipFill>
+        <p:spPr>
+          <a:xfrm>
+            <a:off x="10309225" y="18804070"/>
+            <a:ext cx="6870700" cy="1676400"/>
+          </a:xfrm>
+          <a:prstGeom prst="rect">
+            <a:avLst/>
+          </a:prstGeom>
+        </p:spPr>
+      </p:pic>
+      <p:pic>
+        <p:nvPicPr>
+          <p:cNvPr id="26" name="Image 25">
+            <a:extLst>
+              <a:ext uri="{FF2B5EF4-FFF2-40B4-BE49-F238E27FC236}">
+                <a16:creationId xmlns:a16="http://schemas.microsoft.com/office/drawing/2014/main" id="{A9B2C7C5-8CB1-9A49-B25F-D17CD42ADB9E}"/>
+              </a:ext>
+            </a:extLst>
+          </p:cNvPr>
+          <p:cNvPicPr>
+            <a:picLocks noChangeAspect="1"/>
+          </p:cNvPicPr>
+          <p:nvPr/>
+        </p:nvPicPr>
+        <p:blipFill>
+          <a:blip r:embed="rId11"/>
+          <a:stretch>
+            <a:fillRect/>
+          </a:stretch>
+        </p:blipFill>
+        <p:spPr>
+          <a:xfrm>
+            <a:off x="9877441" y="9778396"/>
+            <a:ext cx="7631885" cy="3815943"/>
+          </a:xfrm>
+          <a:prstGeom prst="rect">
+            <a:avLst/>
+          </a:prstGeom>
+          <a:ln>
+            <a:noFill/>
+          </a:ln>
+        </p:spPr>
+      </p:pic>
+      <p:pic>
+        <p:nvPicPr>
+          <p:cNvPr id="27" name="Image 26">
+            <a:extLst>
+              <a:ext uri="{FF2B5EF4-FFF2-40B4-BE49-F238E27FC236}">
+                <a16:creationId xmlns:a16="http://schemas.microsoft.com/office/drawing/2014/main" id="{FA8F1C66-A427-664F-8562-8C6E76466F27}"/>
+              </a:ext>
+            </a:extLst>
+          </p:cNvPr>
+          <p:cNvPicPr>
+            <a:picLocks noChangeAspect="1"/>
+          </p:cNvPicPr>
+          <p:nvPr/>
+        </p:nvPicPr>
+        <p:blipFill>
+          <a:blip r:embed="rId12"/>
+          <a:stretch>
+            <a:fillRect/>
+          </a:stretch>
+        </p:blipFill>
+        <p:spPr>
+          <a:xfrm>
+            <a:off x="18619467" y="7854290"/>
+            <a:ext cx="8064423" cy="4348463"/>
+          </a:xfrm>
+          <a:prstGeom prst="rect">
+            <a:avLst/>
+          </a:prstGeom>
+        </p:spPr>
+      </p:pic>
     </p:spTree>
     <p:extLst>
       <p:ext uri="{BB962C8B-B14F-4D97-AF65-F5344CB8AC3E}">
@@ -14808,6 +14713,1583 @@
     </mc:Choice>
     <mc:Fallback xmlns="">
       <p:transition/>
+    </mc:Fallback>
+  </mc:AlternateContent>
+</p:sld>
+</file>
+
+<file path=ppt/slides/slide2.xml><?xml version="1.0" encoding="utf-8"?>
+<p:sld xmlns:a="http://schemas.openxmlformats.org/drawingml/2006/main" xmlns:r="http://schemas.openxmlformats.org/officeDocument/2006/relationships" xmlns:p="http://schemas.openxmlformats.org/presentationml/2006/main">
+  <p:cSld>
+    <p:spTree>
+      <p:nvGrpSpPr>
+        <p:cNvPr id="1" name=""/>
+        <p:cNvGrpSpPr/>
+        <p:nvPr/>
+      </p:nvGrpSpPr>
+      <p:grpSpPr>
+        <a:xfrm>
+          <a:off x="0" y="0"/>
+          <a:ext cx="0" cy="0"/>
+          <a:chOff x="0" y="0"/>
+          <a:chExt cx="0" cy="0"/>
+        </a:xfrm>
+      </p:grpSpPr>
+      <p:sp>
+        <p:nvSpPr>
+          <p:cNvPr id="2" name="Espace réservé du pied de page 1">
+            <a:extLst>
+              <a:ext uri="{FF2B5EF4-FFF2-40B4-BE49-F238E27FC236}">
+                <a16:creationId xmlns:a16="http://schemas.microsoft.com/office/drawing/2014/main" id="{4510DA3D-9EBB-794F-B6BF-312BD9682E82}"/>
+              </a:ext>
+            </a:extLst>
+          </p:cNvPr>
+          <p:cNvSpPr>
+            <a:spLocks noGrp="1"/>
+          </p:cNvSpPr>
+          <p:nvPr>
+            <p:ph type="ftr" sz="quarter" idx="3"/>
+          </p:nvPr>
+        </p:nvSpPr>
+        <p:spPr/>
+        <p:txBody>
+          <a:bodyPr/>
+          <a:lstStyle/>
+          <a:p>
+            <a:r>
+              <a:rPr lang="en-US"/>
+              <a:t>Towards trusted human-centric robot autonomy</a:t>
+            </a:r>
+            <a:endParaRPr lang="en-US" dirty="0"/>
+          </a:p>
+        </p:txBody>
+      </p:sp>
+      <p:sp>
+        <p:nvSpPr>
+          <p:cNvPr id="3" name="Espace réservé du numéro de diapositive 2">
+            <a:extLst>
+              <a:ext uri="{FF2B5EF4-FFF2-40B4-BE49-F238E27FC236}">
+                <a16:creationId xmlns:a16="http://schemas.microsoft.com/office/drawing/2014/main" id="{DACE76DA-7DAD-9844-AD52-F90AF502C3F8}"/>
+              </a:ext>
+            </a:extLst>
+          </p:cNvPr>
+          <p:cNvSpPr>
+            <a:spLocks noGrp="1"/>
+          </p:cNvSpPr>
+          <p:nvPr>
+            <p:ph type="sldNum" sz="quarter" idx="4"/>
+          </p:nvPr>
+        </p:nvSpPr>
+        <p:spPr/>
+        <p:txBody>
+          <a:bodyPr/>
+          <a:lstStyle/>
+          <a:p>
+            <a:fld id="{0C5720C1-DBBE-464B-BDF3-8863F8043B23}" type="slidenum">
+              <a:rPr lang="en-US" smtClean="0"/>
+              <a:t>2</a:t>
+            </a:fld>
+            <a:endParaRPr lang="en-US" dirty="0"/>
+          </a:p>
+        </p:txBody>
+      </p:sp>
+      <p:cxnSp>
+        <p:nvCxnSpPr>
+          <p:cNvPr id="5" name="Connecteur droit 4">
+            <a:extLst>
+              <a:ext uri="{FF2B5EF4-FFF2-40B4-BE49-F238E27FC236}">
+                <a16:creationId xmlns:a16="http://schemas.microsoft.com/office/drawing/2014/main" id="{52612901-9D1A-9F4F-A901-40CBDB2BC4EB}"/>
+              </a:ext>
+            </a:extLst>
+          </p:cNvPr>
+          <p:cNvCxnSpPr>
+            <a:cxnSpLocks/>
+          </p:cNvCxnSpPr>
+          <p:nvPr/>
+        </p:nvCxnSpPr>
+        <p:spPr>
+          <a:xfrm>
+            <a:off x="9829800" y="7277100"/>
+            <a:ext cx="4191000" cy="0"/>
+          </a:xfrm>
+          <a:prstGeom prst="line">
+            <a:avLst/>
+          </a:prstGeom>
+          <a:ln w="76200">
+            <a:solidFill>
+              <a:schemeClr val="tx1"/>
+            </a:solidFill>
+            <a:headEnd type="triangle" w="lg" len="med"/>
+          </a:ln>
+        </p:spPr>
+        <p:style>
+          <a:lnRef idx="1">
+            <a:schemeClr val="accent1"/>
+          </a:lnRef>
+          <a:fillRef idx="0">
+            <a:schemeClr val="accent1"/>
+          </a:fillRef>
+          <a:effectRef idx="0">
+            <a:schemeClr val="accent1"/>
+          </a:effectRef>
+          <a:fontRef idx="minor">
+            <a:schemeClr val="tx1"/>
+          </a:fontRef>
+        </p:style>
+      </p:cxnSp>
+      <p:cxnSp>
+        <p:nvCxnSpPr>
+          <p:cNvPr id="6" name="Connecteur droit 5">
+            <a:extLst>
+              <a:ext uri="{FF2B5EF4-FFF2-40B4-BE49-F238E27FC236}">
+                <a16:creationId xmlns:a16="http://schemas.microsoft.com/office/drawing/2014/main" id="{AB8D28D8-69D9-BE4F-AFBC-8137E84EEBC5}"/>
+              </a:ext>
+            </a:extLst>
+          </p:cNvPr>
+          <p:cNvCxnSpPr>
+            <a:cxnSpLocks/>
+          </p:cNvCxnSpPr>
+          <p:nvPr/>
+        </p:nvCxnSpPr>
+        <p:spPr>
+          <a:xfrm flipV="1">
+            <a:off x="14020800" y="7277100"/>
+            <a:ext cx="0" cy="6660395"/>
+          </a:xfrm>
+          <a:prstGeom prst="line">
+            <a:avLst/>
+          </a:prstGeom>
+          <a:ln w="76200">
+            <a:solidFill>
+              <a:schemeClr val="tx1"/>
+            </a:solidFill>
+            <a:headEnd type="triangle" w="lg" len="med"/>
+          </a:ln>
+        </p:spPr>
+        <p:style>
+          <a:lnRef idx="1">
+            <a:schemeClr val="accent1"/>
+          </a:lnRef>
+          <a:fillRef idx="0">
+            <a:schemeClr val="accent1"/>
+          </a:fillRef>
+          <a:effectRef idx="0">
+            <a:schemeClr val="accent1"/>
+          </a:effectRef>
+          <a:fontRef idx="minor">
+            <a:schemeClr val="tx1"/>
+          </a:fontRef>
+        </p:style>
+      </p:cxnSp>
+      <p:cxnSp>
+        <p:nvCxnSpPr>
+          <p:cNvPr id="11" name="Connecteur droit 10">
+            <a:extLst>
+              <a:ext uri="{FF2B5EF4-FFF2-40B4-BE49-F238E27FC236}">
+                <a16:creationId xmlns:a16="http://schemas.microsoft.com/office/drawing/2014/main" id="{3C33CA46-CD46-4F44-96BC-6C1C16131D34}"/>
+              </a:ext>
+            </a:extLst>
+          </p:cNvPr>
+          <p:cNvCxnSpPr>
+            <a:cxnSpLocks/>
+          </p:cNvCxnSpPr>
+          <p:nvPr/>
+        </p:nvCxnSpPr>
+        <p:spPr>
+          <a:xfrm flipV="1">
+            <a:off x="12539094" y="7277099"/>
+            <a:ext cx="1481706" cy="4001474"/>
+          </a:xfrm>
+          <a:prstGeom prst="line">
+            <a:avLst/>
+          </a:prstGeom>
+          <a:ln w="76200">
+            <a:solidFill>
+              <a:schemeClr val="tx1"/>
+            </a:solidFill>
+          </a:ln>
+        </p:spPr>
+        <p:style>
+          <a:lnRef idx="1">
+            <a:schemeClr val="accent1"/>
+          </a:lnRef>
+          <a:fillRef idx="0">
+            <a:schemeClr val="accent1"/>
+          </a:fillRef>
+          <a:effectRef idx="0">
+            <a:schemeClr val="accent1"/>
+          </a:effectRef>
+          <a:fontRef idx="minor">
+            <a:schemeClr val="tx1"/>
+          </a:fontRef>
+        </p:style>
+      </p:cxnSp>
+      <p:sp>
+        <p:nvSpPr>
+          <p:cNvPr id="13" name="Rectangle 12">
+            <a:extLst>
+              <a:ext uri="{FF2B5EF4-FFF2-40B4-BE49-F238E27FC236}">
+                <a16:creationId xmlns:a16="http://schemas.microsoft.com/office/drawing/2014/main" id="{BA8E5D8F-7C03-D44D-8B8D-3BD097AFB9E7}"/>
+              </a:ext>
+            </a:extLst>
+          </p:cNvPr>
+          <p:cNvSpPr/>
+          <p:nvPr/>
+        </p:nvSpPr>
+        <p:spPr>
+          <a:xfrm rot="1200000">
+            <a:off x="11497457" y="11240906"/>
+            <a:ext cx="1752600" cy="1048185"/>
+          </a:xfrm>
+          <a:prstGeom prst="rect">
+            <a:avLst/>
+          </a:prstGeom>
+          <a:solidFill>
+            <a:schemeClr val="bg1"/>
+          </a:solidFill>
+          <a:ln w="76200">
+            <a:solidFill>
+              <a:schemeClr val="tx1"/>
+            </a:solidFill>
+          </a:ln>
+        </p:spPr>
+        <p:style>
+          <a:lnRef idx="2">
+            <a:schemeClr val="accent1">
+              <a:shade val="50000"/>
+            </a:schemeClr>
+          </a:lnRef>
+          <a:fillRef idx="1">
+            <a:schemeClr val="accent1"/>
+          </a:fillRef>
+          <a:effectRef idx="0">
+            <a:schemeClr val="accent1"/>
+          </a:effectRef>
+          <a:fontRef idx="minor">
+            <a:schemeClr val="lt1"/>
+          </a:fontRef>
+        </p:style>
+        <p:txBody>
+          <a:bodyPr rtlCol="0" anchor="ctr"/>
+          <a:lstStyle/>
+          <a:p>
+            <a:pPr algn="ctr"/>
+            <a:endParaRPr lang="fr-NL"/>
+          </a:p>
+        </p:txBody>
+      </p:sp>
+      <p:sp>
+        <p:nvSpPr>
+          <p:cNvPr id="14" name="Arc 13">
+            <a:extLst>
+              <a:ext uri="{FF2B5EF4-FFF2-40B4-BE49-F238E27FC236}">
+                <a16:creationId xmlns:a16="http://schemas.microsoft.com/office/drawing/2014/main" id="{951C8D36-BD57-9D4E-B6BB-5B4196DFB081}"/>
+              </a:ext>
+            </a:extLst>
+          </p:cNvPr>
+          <p:cNvSpPr/>
+          <p:nvPr/>
+        </p:nvSpPr>
+        <p:spPr>
+          <a:xfrm rot="9567294">
+            <a:off x="13279121" y="8518569"/>
+            <a:ext cx="978961" cy="986032"/>
+          </a:xfrm>
+          <a:prstGeom prst="arc">
+            <a:avLst>
+              <a:gd name="adj1" fmla="val 15634009"/>
+              <a:gd name="adj2" fmla="val 0"/>
+            </a:avLst>
+          </a:prstGeom>
+          <a:ln w="76200">
+            <a:solidFill>
+              <a:schemeClr val="tx1"/>
+            </a:solidFill>
+          </a:ln>
+        </p:spPr>
+        <p:style>
+          <a:lnRef idx="1">
+            <a:schemeClr val="accent1"/>
+          </a:lnRef>
+          <a:fillRef idx="0">
+            <a:schemeClr val="accent1"/>
+          </a:fillRef>
+          <a:effectRef idx="0">
+            <a:schemeClr val="accent1"/>
+          </a:effectRef>
+          <a:fontRef idx="minor">
+            <a:schemeClr val="tx1"/>
+          </a:fontRef>
+        </p:style>
+        <p:txBody>
+          <a:bodyPr rtlCol="0" anchor="ctr"/>
+          <a:lstStyle/>
+          <a:p>
+            <a:pPr algn="ctr"/>
+            <a:endParaRPr lang="fr-NL"/>
+          </a:p>
+        </p:txBody>
+      </p:sp>
+      <p:cxnSp>
+        <p:nvCxnSpPr>
+          <p:cNvPr id="15" name="Connecteur droit 14">
+            <a:extLst>
+              <a:ext uri="{FF2B5EF4-FFF2-40B4-BE49-F238E27FC236}">
+                <a16:creationId xmlns:a16="http://schemas.microsoft.com/office/drawing/2014/main" id="{93464BBA-FA3D-764A-BE91-D3F628BB50BF}"/>
+              </a:ext>
+            </a:extLst>
+          </p:cNvPr>
+          <p:cNvCxnSpPr>
+            <a:cxnSpLocks/>
+          </p:cNvCxnSpPr>
+          <p:nvPr/>
+        </p:nvCxnSpPr>
+        <p:spPr>
+          <a:xfrm>
+            <a:off x="10586730" y="11114574"/>
+            <a:ext cx="1787027" cy="650424"/>
+          </a:xfrm>
+          <a:prstGeom prst="line">
+            <a:avLst/>
+          </a:prstGeom>
+          <a:ln w="76200">
+            <a:solidFill>
+              <a:schemeClr val="tx1"/>
+            </a:solidFill>
+            <a:headEnd type="triangle" w="lg" len="med"/>
+          </a:ln>
+        </p:spPr>
+        <p:style>
+          <a:lnRef idx="1">
+            <a:schemeClr val="accent1"/>
+          </a:lnRef>
+          <a:fillRef idx="0">
+            <a:schemeClr val="accent1"/>
+          </a:fillRef>
+          <a:effectRef idx="0">
+            <a:schemeClr val="accent1"/>
+          </a:effectRef>
+          <a:fontRef idx="minor">
+            <a:schemeClr val="tx1"/>
+          </a:fontRef>
+        </p:style>
+      </p:cxnSp>
+      <p:cxnSp>
+        <p:nvCxnSpPr>
+          <p:cNvPr id="21" name="Connecteur droit 20">
+            <a:extLst>
+              <a:ext uri="{FF2B5EF4-FFF2-40B4-BE49-F238E27FC236}">
+                <a16:creationId xmlns:a16="http://schemas.microsoft.com/office/drawing/2014/main" id="{26E468AE-BD3D-8949-9E72-EA82DB918F62}"/>
+              </a:ext>
+            </a:extLst>
+          </p:cNvPr>
+          <p:cNvCxnSpPr>
+            <a:cxnSpLocks/>
+          </p:cNvCxnSpPr>
+          <p:nvPr/>
+        </p:nvCxnSpPr>
+        <p:spPr>
+          <a:xfrm>
+            <a:off x="10120891" y="11764998"/>
+            <a:ext cx="2204722" cy="0"/>
+          </a:xfrm>
+          <a:prstGeom prst="line">
+            <a:avLst/>
+          </a:prstGeom>
+          <a:ln w="76200">
+            <a:solidFill>
+              <a:schemeClr val="tx1"/>
+            </a:solidFill>
+            <a:headEnd type="triangle" w="lg" len="med"/>
+          </a:ln>
+        </p:spPr>
+        <p:style>
+          <a:lnRef idx="1">
+            <a:schemeClr val="accent1"/>
+          </a:lnRef>
+          <a:fillRef idx="0">
+            <a:schemeClr val="accent1"/>
+          </a:fillRef>
+          <a:effectRef idx="0">
+            <a:schemeClr val="accent1"/>
+          </a:effectRef>
+          <a:fontRef idx="minor">
+            <a:schemeClr val="tx1"/>
+          </a:fontRef>
+        </p:style>
+      </p:cxnSp>
+      <p:cxnSp>
+        <p:nvCxnSpPr>
+          <p:cNvPr id="23" name="Connecteur droit 22">
+            <a:extLst>
+              <a:ext uri="{FF2B5EF4-FFF2-40B4-BE49-F238E27FC236}">
+                <a16:creationId xmlns:a16="http://schemas.microsoft.com/office/drawing/2014/main" id="{4B356099-8DA7-1042-9ABA-B90342B01401}"/>
+              </a:ext>
+            </a:extLst>
+          </p:cNvPr>
+          <p:cNvCxnSpPr>
+            <a:cxnSpLocks/>
+          </p:cNvCxnSpPr>
+          <p:nvPr/>
+        </p:nvCxnSpPr>
+        <p:spPr>
+          <a:xfrm flipV="1">
+            <a:off x="12373757" y="11764998"/>
+            <a:ext cx="0" cy="1801257"/>
+          </a:xfrm>
+          <a:prstGeom prst="line">
+            <a:avLst/>
+          </a:prstGeom>
+          <a:ln w="76200">
+            <a:solidFill>
+              <a:schemeClr val="tx1"/>
+            </a:solidFill>
+            <a:headEnd type="triangle" w="lg" len="med"/>
+          </a:ln>
+        </p:spPr>
+        <p:style>
+          <a:lnRef idx="1">
+            <a:schemeClr val="accent1"/>
+          </a:lnRef>
+          <a:fillRef idx="0">
+            <a:schemeClr val="accent1"/>
+          </a:fillRef>
+          <a:effectRef idx="0">
+            <a:schemeClr val="accent1"/>
+          </a:effectRef>
+          <a:fontRef idx="minor">
+            <a:schemeClr val="tx1"/>
+          </a:fontRef>
+        </p:style>
+      </p:cxnSp>
+      <p:cxnSp>
+        <p:nvCxnSpPr>
+          <p:cNvPr id="25" name="Connecteur droit 24">
+            <a:extLst>
+              <a:ext uri="{FF2B5EF4-FFF2-40B4-BE49-F238E27FC236}">
+                <a16:creationId xmlns:a16="http://schemas.microsoft.com/office/drawing/2014/main" id="{0CEE43D0-15C9-A14E-B216-B10F7CA3AF5A}"/>
+              </a:ext>
+            </a:extLst>
+          </p:cNvPr>
+          <p:cNvCxnSpPr>
+            <a:cxnSpLocks/>
+          </p:cNvCxnSpPr>
+          <p:nvPr/>
+        </p:nvCxnSpPr>
+        <p:spPr>
+          <a:xfrm>
+            <a:off x="14833344" y="11772475"/>
+            <a:ext cx="2204722" cy="0"/>
+          </a:xfrm>
+          <a:prstGeom prst="line">
+            <a:avLst/>
+          </a:prstGeom>
+          <a:ln w="76200">
+            <a:solidFill>
+              <a:schemeClr val="tx1"/>
+            </a:solidFill>
+            <a:headEnd type="triangle" w="lg" len="med"/>
+          </a:ln>
+        </p:spPr>
+        <p:style>
+          <a:lnRef idx="1">
+            <a:schemeClr val="accent1"/>
+          </a:lnRef>
+          <a:fillRef idx="0">
+            <a:schemeClr val="accent1"/>
+          </a:fillRef>
+          <a:effectRef idx="0">
+            <a:schemeClr val="accent1"/>
+          </a:effectRef>
+          <a:fontRef idx="minor">
+            <a:schemeClr val="tx1"/>
+          </a:fontRef>
+        </p:style>
+      </p:cxnSp>
+      <mc:AlternateContent xmlns:mc="http://schemas.openxmlformats.org/markup-compatibility/2006">
+        <mc:Choice xmlns:a14="http://schemas.microsoft.com/office/drawing/2010/main" Requires="a14">
+          <p:sp>
+            <p:nvSpPr>
+              <p:cNvPr id="26" name="ZoneTexte 25">
+                <a:extLst>
+                  <a:ext uri="{FF2B5EF4-FFF2-40B4-BE49-F238E27FC236}">
+                    <a16:creationId xmlns:a16="http://schemas.microsoft.com/office/drawing/2014/main" id="{E302A87B-50B5-B04B-8A23-78DCD814B786}"/>
+                  </a:ext>
+                </a:extLst>
+              </p:cNvPr>
+              <p:cNvSpPr txBox="1"/>
+              <p:nvPr/>
+            </p:nvSpPr>
+            <p:spPr>
+              <a:xfrm>
+                <a:off x="15060014" y="10924630"/>
+                <a:ext cx="1875581" cy="707886"/>
+              </a:xfrm>
+              <a:prstGeom prst="rect">
+                <a:avLst/>
+              </a:prstGeom>
+              <a:noFill/>
+            </p:spPr>
+            <p:txBody>
+              <a:bodyPr wrap="square" rtlCol="0">
+                <a:spAutoFit/>
+              </a:bodyPr>
+              <a:lstStyle/>
+              <a:p>
+                <a14:m>
+                  <m:oMathPara xmlns:m="http://schemas.openxmlformats.org/officeDocument/2006/math">
+                    <m:oMathParaPr>
+                      <m:jc m:val="centerGroup"/>
+                    </m:oMathParaPr>
+                    <m:oMath xmlns:m="http://schemas.openxmlformats.org/officeDocument/2006/math">
+                      <m:sSub>
+                        <m:sSubPr>
+                          <m:ctrlPr>
+                            <a:rPr lang="en-US" sz="4000" b="0" i="1" smtClean="0">
+                              <a:latin typeface="Cambria Math" panose="02040503050406030204" pitchFamily="18" charset="0"/>
+                            </a:rPr>
+                          </m:ctrlPr>
+                        </m:sSubPr>
+                        <m:e>
+                          <m:r>
+                            <a:rPr lang="en-US" sz="4000" b="0" i="1" smtClean="0">
+                              <a:latin typeface="Cambria Math" panose="02040503050406030204" pitchFamily="18" charset="0"/>
+                            </a:rPr>
+                            <m:t>𝑉</m:t>
+                          </m:r>
+                        </m:e>
+                        <m:sub>
+                          <m:r>
+                            <a:rPr lang="en-US" sz="4000" b="0" i="1" smtClean="0">
+                              <a:latin typeface="Cambria Math" panose="02040503050406030204" pitchFamily="18" charset="0"/>
+                            </a:rPr>
+                            <m:t>𝑤𝑖𝑛𝑑</m:t>
+                          </m:r>
+                        </m:sub>
+                      </m:sSub>
+                    </m:oMath>
+                  </m:oMathPara>
+                </a14:m>
+                <a:endParaRPr lang="fr-NL" sz="4000" dirty="0"/>
+              </a:p>
+            </p:txBody>
+          </p:sp>
+        </mc:Choice>
+        <mc:Fallback>
+          <p:sp>
+            <p:nvSpPr>
+              <p:cNvPr id="26" name="ZoneTexte 25">
+                <a:extLst>
+                  <a:ext uri="{FF2B5EF4-FFF2-40B4-BE49-F238E27FC236}">
+                    <a16:creationId xmlns:a16="http://schemas.microsoft.com/office/drawing/2014/main" id="{E302A87B-50B5-B04B-8A23-78DCD814B786}"/>
+                  </a:ext>
+                </a:extLst>
+              </p:cNvPr>
+              <p:cNvSpPr txBox="1">
+                <a:spLocks noRot="1" noChangeAspect="1" noMove="1" noResize="1" noEditPoints="1" noAdjustHandles="1" noChangeArrowheads="1" noChangeShapeType="1" noTextEdit="1"/>
+              </p:cNvSpPr>
+              <p:nvPr/>
+            </p:nvSpPr>
+            <p:spPr>
+              <a:xfrm>
+                <a:off x="15060014" y="10924630"/>
+                <a:ext cx="1875581" cy="707886"/>
+              </a:xfrm>
+              <a:prstGeom prst="rect">
+                <a:avLst/>
+              </a:prstGeom>
+              <a:blipFill>
+                <a:blip r:embed="rId3"/>
+                <a:stretch>
+                  <a:fillRect b="-10714"/>
+                </a:stretch>
+              </a:blipFill>
+            </p:spPr>
+            <p:txBody>
+              <a:bodyPr/>
+              <a:lstStyle/>
+              <a:p>
+                <a:r>
+                  <a:rPr lang="fr-NL">
+                    <a:noFill/>
+                  </a:rPr>
+                  <a:t> </a:t>
+                </a:r>
+              </a:p>
+            </p:txBody>
+          </p:sp>
+        </mc:Fallback>
+      </mc:AlternateContent>
+      <mc:AlternateContent xmlns:mc="http://schemas.openxmlformats.org/markup-compatibility/2006">
+        <mc:Choice xmlns:a14="http://schemas.microsoft.com/office/drawing/2010/main" Requires="a14">
+          <p:sp>
+            <p:nvSpPr>
+              <p:cNvPr id="27" name="ZoneTexte 26">
+                <a:extLst>
+                  <a:ext uri="{FF2B5EF4-FFF2-40B4-BE49-F238E27FC236}">
+                    <a16:creationId xmlns:a16="http://schemas.microsoft.com/office/drawing/2014/main" id="{341AAEF2-34D0-7F44-8C22-D4608DB40D11}"/>
+                  </a:ext>
+                </a:extLst>
+              </p:cNvPr>
+              <p:cNvSpPr txBox="1"/>
+              <p:nvPr/>
+            </p:nvSpPr>
+            <p:spPr>
+              <a:xfrm>
+                <a:off x="12646314" y="9515933"/>
+                <a:ext cx="1875581" cy="707886"/>
+              </a:xfrm>
+              <a:prstGeom prst="rect">
+                <a:avLst/>
+              </a:prstGeom>
+              <a:noFill/>
+            </p:spPr>
+            <p:txBody>
+              <a:bodyPr wrap="square" rtlCol="0">
+                <a:spAutoFit/>
+              </a:bodyPr>
+              <a:lstStyle/>
+              <a:p>
+                <a14:m>
+                  <m:oMathPara xmlns:m="http://schemas.openxmlformats.org/officeDocument/2006/math">
+                    <m:oMathParaPr>
+                      <m:jc m:val="centerGroup"/>
+                    </m:oMathParaPr>
+                    <m:oMath xmlns:m="http://schemas.openxmlformats.org/officeDocument/2006/math">
+                      <m:r>
+                        <a:rPr lang="fr-NL" sz="4000" i="1" smtClean="0">
+                          <a:latin typeface="Cambria Math" panose="02040503050406030204" pitchFamily="18" charset="0"/>
+                          <a:ea typeface="Cambria Math" panose="02040503050406030204" pitchFamily="18" charset="0"/>
+                        </a:rPr>
+                        <m:t>𝜃</m:t>
+                      </m:r>
+                    </m:oMath>
+                  </m:oMathPara>
+                </a14:m>
+                <a:endParaRPr lang="fr-NL" sz="4000" dirty="0"/>
+              </a:p>
+            </p:txBody>
+          </p:sp>
+        </mc:Choice>
+        <mc:Fallback>
+          <p:sp>
+            <p:nvSpPr>
+              <p:cNvPr id="27" name="ZoneTexte 26">
+                <a:extLst>
+                  <a:ext uri="{FF2B5EF4-FFF2-40B4-BE49-F238E27FC236}">
+                    <a16:creationId xmlns:a16="http://schemas.microsoft.com/office/drawing/2014/main" id="{341AAEF2-34D0-7F44-8C22-D4608DB40D11}"/>
+                  </a:ext>
+                </a:extLst>
+              </p:cNvPr>
+              <p:cNvSpPr txBox="1">
+                <a:spLocks noRot="1" noChangeAspect="1" noMove="1" noResize="1" noEditPoints="1" noAdjustHandles="1" noChangeArrowheads="1" noChangeShapeType="1" noTextEdit="1"/>
+              </p:cNvSpPr>
+              <p:nvPr/>
+            </p:nvSpPr>
+            <p:spPr>
+              <a:xfrm>
+                <a:off x="12646314" y="9515933"/>
+                <a:ext cx="1875581" cy="707886"/>
+              </a:xfrm>
+              <a:prstGeom prst="rect">
+                <a:avLst/>
+              </a:prstGeom>
+              <a:blipFill>
+                <a:blip r:embed="rId4"/>
+                <a:stretch>
+                  <a:fillRect b="-1786"/>
+                </a:stretch>
+              </a:blipFill>
+            </p:spPr>
+            <p:txBody>
+              <a:bodyPr/>
+              <a:lstStyle/>
+              <a:p>
+                <a:r>
+                  <a:rPr lang="fr-NL">
+                    <a:noFill/>
+                  </a:rPr>
+                  <a:t> </a:t>
+                </a:r>
+              </a:p>
+            </p:txBody>
+          </p:sp>
+        </mc:Fallback>
+      </mc:AlternateContent>
+      <mc:AlternateContent xmlns:mc="http://schemas.openxmlformats.org/markup-compatibility/2006">
+        <mc:Choice xmlns:a14="http://schemas.microsoft.com/office/drawing/2010/main" Requires="a14">
+          <p:sp>
+            <p:nvSpPr>
+              <p:cNvPr id="28" name="ZoneTexte 27">
+                <a:extLst>
+                  <a:ext uri="{FF2B5EF4-FFF2-40B4-BE49-F238E27FC236}">
+                    <a16:creationId xmlns:a16="http://schemas.microsoft.com/office/drawing/2014/main" id="{F18D60E5-8A49-8B4F-929D-4D497377951A}"/>
+                  </a:ext>
+                </a:extLst>
+              </p:cNvPr>
+              <p:cNvSpPr txBox="1"/>
+              <p:nvPr/>
+            </p:nvSpPr>
+            <p:spPr>
+              <a:xfrm>
+                <a:off x="11441097" y="13583552"/>
+                <a:ext cx="1875581" cy="707886"/>
+              </a:xfrm>
+              <a:prstGeom prst="rect">
+                <a:avLst/>
+              </a:prstGeom>
+              <a:noFill/>
+            </p:spPr>
+            <p:txBody>
+              <a:bodyPr wrap="square" rtlCol="0">
+                <a:spAutoFit/>
+              </a:bodyPr>
+              <a:lstStyle/>
+              <a:p>
+                <a14:m>
+                  <m:oMathPara xmlns:m="http://schemas.openxmlformats.org/officeDocument/2006/math">
+                    <m:oMathParaPr>
+                      <m:jc m:val="centerGroup"/>
+                    </m:oMathParaPr>
+                    <m:oMath xmlns:m="http://schemas.openxmlformats.org/officeDocument/2006/math">
+                      <m:r>
+                        <a:rPr lang="en-US" sz="4000" b="0" i="1" smtClean="0">
+                          <a:latin typeface="Cambria Math" panose="02040503050406030204" pitchFamily="18" charset="0"/>
+                          <a:ea typeface="Cambria Math" panose="02040503050406030204" pitchFamily="18" charset="0"/>
+                        </a:rPr>
+                        <m:t>𝑚𝑔</m:t>
+                      </m:r>
+                    </m:oMath>
+                  </m:oMathPara>
+                </a14:m>
+                <a:endParaRPr lang="fr-NL" sz="4000" dirty="0"/>
+              </a:p>
+            </p:txBody>
+          </p:sp>
+        </mc:Choice>
+        <mc:Fallback>
+          <p:sp>
+            <p:nvSpPr>
+              <p:cNvPr id="28" name="ZoneTexte 27">
+                <a:extLst>
+                  <a:ext uri="{FF2B5EF4-FFF2-40B4-BE49-F238E27FC236}">
+                    <a16:creationId xmlns:a16="http://schemas.microsoft.com/office/drawing/2014/main" id="{F18D60E5-8A49-8B4F-929D-4D497377951A}"/>
+                  </a:ext>
+                </a:extLst>
+              </p:cNvPr>
+              <p:cNvSpPr txBox="1">
+                <a:spLocks noRot="1" noChangeAspect="1" noMove="1" noResize="1" noEditPoints="1" noAdjustHandles="1" noChangeArrowheads="1" noChangeShapeType="1" noTextEdit="1"/>
+              </p:cNvSpPr>
+              <p:nvPr/>
+            </p:nvSpPr>
+            <p:spPr>
+              <a:xfrm>
+                <a:off x="11441097" y="13583552"/>
+                <a:ext cx="1875581" cy="707886"/>
+              </a:xfrm>
+              <a:prstGeom prst="rect">
+                <a:avLst/>
+              </a:prstGeom>
+              <a:blipFill>
+                <a:blip r:embed="rId5"/>
+                <a:stretch>
+                  <a:fillRect b="-17544"/>
+                </a:stretch>
+              </a:blipFill>
+            </p:spPr>
+            <p:txBody>
+              <a:bodyPr/>
+              <a:lstStyle/>
+              <a:p>
+                <a:r>
+                  <a:rPr lang="fr-NL">
+                    <a:noFill/>
+                  </a:rPr>
+                  <a:t> </a:t>
+                </a:r>
+              </a:p>
+            </p:txBody>
+          </p:sp>
+        </mc:Fallback>
+      </mc:AlternateContent>
+      <mc:AlternateContent xmlns:mc="http://schemas.openxmlformats.org/markup-compatibility/2006">
+        <mc:Choice xmlns:a14="http://schemas.microsoft.com/office/drawing/2010/main" Requires="a14">
+          <p:sp>
+            <p:nvSpPr>
+              <p:cNvPr id="29" name="ZoneTexte 28">
+                <a:extLst>
+                  <a:ext uri="{FF2B5EF4-FFF2-40B4-BE49-F238E27FC236}">
+                    <a16:creationId xmlns:a16="http://schemas.microsoft.com/office/drawing/2014/main" id="{2293746E-211F-C749-AF53-0DC26E82D61B}"/>
+                  </a:ext>
+                </a:extLst>
+              </p:cNvPr>
+              <p:cNvSpPr txBox="1"/>
+              <p:nvPr/>
+            </p:nvSpPr>
+            <p:spPr>
+              <a:xfrm>
+                <a:off x="9357249" y="11906772"/>
+                <a:ext cx="1875581" cy="707886"/>
+              </a:xfrm>
+              <a:prstGeom prst="rect">
+                <a:avLst/>
+              </a:prstGeom>
+              <a:noFill/>
+            </p:spPr>
+            <p:txBody>
+              <a:bodyPr wrap="square" rtlCol="0">
+                <a:spAutoFit/>
+              </a:bodyPr>
+              <a:lstStyle/>
+              <a:p>
+                <a14:m>
+                  <m:oMathPara xmlns:m="http://schemas.openxmlformats.org/officeDocument/2006/math">
+                    <m:oMathParaPr>
+                      <m:jc m:val="centerGroup"/>
+                    </m:oMathParaPr>
+                    <m:oMath xmlns:m="http://schemas.openxmlformats.org/officeDocument/2006/math">
+                      <m:sSub>
+                        <m:sSubPr>
+                          <m:ctrlPr>
+                            <a:rPr lang="en-US" sz="4000" b="0" i="1" dirty="0" smtClean="0">
+                              <a:latin typeface="Cambria Math" panose="02040503050406030204" pitchFamily="18" charset="0"/>
+                            </a:rPr>
+                          </m:ctrlPr>
+                        </m:sSubPr>
+                        <m:e>
+                          <m:r>
+                            <a:rPr lang="en-US" sz="4000" b="0" i="1" dirty="0" smtClean="0">
+                              <a:latin typeface="Cambria Math" panose="02040503050406030204" pitchFamily="18" charset="0"/>
+                            </a:rPr>
+                            <m:t>𝐹</m:t>
+                          </m:r>
+                        </m:e>
+                        <m:sub>
+                          <m:r>
+                            <a:rPr lang="en-US" sz="4000" b="0" i="1" dirty="0" smtClean="0">
+                              <a:latin typeface="Cambria Math" panose="02040503050406030204" pitchFamily="18" charset="0"/>
+                            </a:rPr>
+                            <m:t>𝑤𝑖𝑛𝑑</m:t>
+                          </m:r>
+                        </m:sub>
+                      </m:sSub>
+                    </m:oMath>
+                  </m:oMathPara>
+                </a14:m>
+                <a:endParaRPr lang="fr-NL" sz="4000" dirty="0"/>
+              </a:p>
+            </p:txBody>
+          </p:sp>
+        </mc:Choice>
+        <mc:Fallback>
+          <p:sp>
+            <p:nvSpPr>
+              <p:cNvPr id="29" name="ZoneTexte 28">
+                <a:extLst>
+                  <a:ext uri="{FF2B5EF4-FFF2-40B4-BE49-F238E27FC236}">
+                    <a16:creationId xmlns:a16="http://schemas.microsoft.com/office/drawing/2014/main" id="{2293746E-211F-C749-AF53-0DC26E82D61B}"/>
+                  </a:ext>
+                </a:extLst>
+              </p:cNvPr>
+              <p:cNvSpPr txBox="1">
+                <a:spLocks noRot="1" noChangeAspect="1" noMove="1" noResize="1" noEditPoints="1" noAdjustHandles="1" noChangeArrowheads="1" noChangeShapeType="1" noTextEdit="1"/>
+              </p:cNvSpPr>
+              <p:nvPr/>
+            </p:nvSpPr>
+            <p:spPr>
+              <a:xfrm>
+                <a:off x="9357249" y="11906772"/>
+                <a:ext cx="1875581" cy="707886"/>
+              </a:xfrm>
+              <a:prstGeom prst="rect">
+                <a:avLst/>
+              </a:prstGeom>
+              <a:blipFill>
+                <a:blip r:embed="rId6"/>
+                <a:stretch>
+                  <a:fillRect b="-8772"/>
+                </a:stretch>
+              </a:blipFill>
+            </p:spPr>
+            <p:txBody>
+              <a:bodyPr/>
+              <a:lstStyle/>
+              <a:p>
+                <a:r>
+                  <a:rPr lang="fr-NL">
+                    <a:noFill/>
+                  </a:rPr>
+                  <a:t> </a:t>
+                </a:r>
+              </a:p>
+            </p:txBody>
+          </p:sp>
+        </mc:Fallback>
+      </mc:AlternateContent>
+      <mc:AlternateContent xmlns:mc="http://schemas.openxmlformats.org/markup-compatibility/2006">
+        <mc:Choice xmlns:a14="http://schemas.microsoft.com/office/drawing/2010/main" Requires="a14">
+          <p:sp>
+            <p:nvSpPr>
+              <p:cNvPr id="30" name="ZoneTexte 29">
+                <a:extLst>
+                  <a:ext uri="{FF2B5EF4-FFF2-40B4-BE49-F238E27FC236}">
+                    <a16:creationId xmlns:a16="http://schemas.microsoft.com/office/drawing/2014/main" id="{3B059633-C357-9240-A5DF-A57FC01C22D8}"/>
+                  </a:ext>
+                </a:extLst>
+              </p:cNvPr>
+              <p:cNvSpPr txBox="1"/>
+              <p:nvPr/>
+            </p:nvSpPr>
+            <p:spPr>
+              <a:xfrm>
+                <a:off x="9559315" y="10484257"/>
+                <a:ext cx="1875581" cy="707886"/>
+              </a:xfrm>
+              <a:prstGeom prst="rect">
+                <a:avLst/>
+              </a:prstGeom>
+              <a:noFill/>
+            </p:spPr>
+            <p:txBody>
+              <a:bodyPr wrap="square" rtlCol="0">
+                <a:spAutoFit/>
+              </a:bodyPr>
+              <a:lstStyle/>
+              <a:p>
+                <a14:m>
+                  <m:oMathPara xmlns:m="http://schemas.openxmlformats.org/officeDocument/2006/math">
+                    <m:oMathParaPr>
+                      <m:jc m:val="centerGroup"/>
+                    </m:oMathParaPr>
+                    <m:oMath xmlns:m="http://schemas.openxmlformats.org/officeDocument/2006/math">
+                      <m:r>
+                        <a:rPr lang="en-US" sz="4000" b="0" i="1" dirty="0" smtClean="0">
+                          <a:latin typeface="Cambria Math" panose="02040503050406030204" pitchFamily="18" charset="0"/>
+                        </a:rPr>
+                        <m:t>𝑇</m:t>
+                      </m:r>
+                    </m:oMath>
+                  </m:oMathPara>
+                </a14:m>
+                <a:endParaRPr lang="fr-NL" sz="4000" dirty="0"/>
+              </a:p>
+            </p:txBody>
+          </p:sp>
+        </mc:Choice>
+        <mc:Fallback>
+          <p:sp>
+            <p:nvSpPr>
+              <p:cNvPr id="30" name="ZoneTexte 29">
+                <a:extLst>
+                  <a:ext uri="{FF2B5EF4-FFF2-40B4-BE49-F238E27FC236}">
+                    <a16:creationId xmlns:a16="http://schemas.microsoft.com/office/drawing/2014/main" id="{3B059633-C357-9240-A5DF-A57FC01C22D8}"/>
+                  </a:ext>
+                </a:extLst>
+              </p:cNvPr>
+              <p:cNvSpPr txBox="1">
+                <a:spLocks noRot="1" noChangeAspect="1" noMove="1" noResize="1" noEditPoints="1" noAdjustHandles="1" noChangeArrowheads="1" noChangeShapeType="1" noTextEdit="1"/>
+              </p:cNvSpPr>
+              <p:nvPr/>
+            </p:nvSpPr>
+            <p:spPr>
+              <a:xfrm>
+                <a:off x="9559315" y="10484257"/>
+                <a:ext cx="1875581" cy="707886"/>
+              </a:xfrm>
+              <a:prstGeom prst="rect">
+                <a:avLst/>
+              </a:prstGeom>
+              <a:blipFill>
+                <a:blip r:embed="rId7"/>
+                <a:stretch>
+                  <a:fillRect/>
+                </a:stretch>
+              </a:blipFill>
+            </p:spPr>
+            <p:txBody>
+              <a:bodyPr/>
+              <a:lstStyle/>
+              <a:p>
+                <a:r>
+                  <a:rPr lang="fr-NL">
+                    <a:noFill/>
+                  </a:rPr>
+                  <a:t> </a:t>
+                </a:r>
+              </a:p>
+            </p:txBody>
+          </p:sp>
+        </mc:Fallback>
+      </mc:AlternateContent>
+      <mc:AlternateContent xmlns:mc="http://schemas.openxmlformats.org/markup-compatibility/2006">
+        <mc:Choice xmlns:a14="http://schemas.microsoft.com/office/drawing/2010/main" Requires="a14">
+          <p:sp>
+            <p:nvSpPr>
+              <p:cNvPr id="31" name="ZoneTexte 30">
+                <a:extLst>
+                  <a:ext uri="{FF2B5EF4-FFF2-40B4-BE49-F238E27FC236}">
+                    <a16:creationId xmlns:a16="http://schemas.microsoft.com/office/drawing/2014/main" id="{34B2122A-6F55-1D4C-B201-89311CBACE78}"/>
+                  </a:ext>
+                </a:extLst>
+              </p:cNvPr>
+              <p:cNvSpPr txBox="1"/>
+              <p:nvPr/>
+            </p:nvSpPr>
+            <p:spPr>
+              <a:xfrm>
+                <a:off x="9118680" y="7388111"/>
+                <a:ext cx="1875581" cy="707886"/>
+              </a:xfrm>
+              <a:prstGeom prst="rect">
+                <a:avLst/>
+              </a:prstGeom>
+              <a:noFill/>
+            </p:spPr>
+            <p:txBody>
+              <a:bodyPr wrap="square" rtlCol="0">
+                <a:spAutoFit/>
+              </a:bodyPr>
+              <a:lstStyle/>
+              <a:p>
+                <a14:m>
+                  <m:oMathPara xmlns:m="http://schemas.openxmlformats.org/officeDocument/2006/math">
+                    <m:oMathParaPr>
+                      <m:jc m:val="centerGroup"/>
+                    </m:oMathParaPr>
+                    <m:oMath xmlns:m="http://schemas.openxmlformats.org/officeDocument/2006/math">
+                      <m:r>
+                        <a:rPr lang="en-US" sz="4000" b="0" i="1" smtClean="0">
+                          <a:latin typeface="Cambria Math" panose="02040503050406030204" pitchFamily="18" charset="0"/>
+                        </a:rPr>
+                        <m:t>𝑥</m:t>
+                      </m:r>
+                    </m:oMath>
+                  </m:oMathPara>
+                </a14:m>
+                <a:endParaRPr lang="fr-NL" sz="4000" dirty="0"/>
+              </a:p>
+            </p:txBody>
+          </p:sp>
+        </mc:Choice>
+        <mc:Fallback>
+          <p:sp>
+            <p:nvSpPr>
+              <p:cNvPr id="31" name="ZoneTexte 30">
+                <a:extLst>
+                  <a:ext uri="{FF2B5EF4-FFF2-40B4-BE49-F238E27FC236}">
+                    <a16:creationId xmlns:a16="http://schemas.microsoft.com/office/drawing/2014/main" id="{34B2122A-6F55-1D4C-B201-89311CBACE78}"/>
+                  </a:ext>
+                </a:extLst>
+              </p:cNvPr>
+              <p:cNvSpPr txBox="1">
+                <a:spLocks noRot="1" noChangeAspect="1" noMove="1" noResize="1" noEditPoints="1" noAdjustHandles="1" noChangeArrowheads="1" noChangeShapeType="1" noTextEdit="1"/>
+              </p:cNvSpPr>
+              <p:nvPr/>
+            </p:nvSpPr>
+            <p:spPr>
+              <a:xfrm>
+                <a:off x="9118680" y="7388111"/>
+                <a:ext cx="1875581" cy="707886"/>
+              </a:xfrm>
+              <a:prstGeom prst="rect">
+                <a:avLst/>
+              </a:prstGeom>
+              <a:blipFill>
+                <a:blip r:embed="rId8"/>
+                <a:stretch>
+                  <a:fillRect/>
+                </a:stretch>
+              </a:blipFill>
+            </p:spPr>
+            <p:txBody>
+              <a:bodyPr/>
+              <a:lstStyle/>
+              <a:p>
+                <a:r>
+                  <a:rPr lang="fr-NL">
+                    <a:noFill/>
+                  </a:rPr>
+                  <a:t> </a:t>
+                </a:r>
+              </a:p>
+            </p:txBody>
+          </p:sp>
+        </mc:Fallback>
+      </mc:AlternateContent>
+      <mc:AlternateContent xmlns:mc="http://schemas.openxmlformats.org/markup-compatibility/2006">
+        <mc:Choice xmlns:a14="http://schemas.microsoft.com/office/drawing/2010/main" Requires="a14">
+          <p:sp>
+            <p:nvSpPr>
+              <p:cNvPr id="32" name="ZoneTexte 31">
+                <a:extLst>
+                  <a:ext uri="{FF2B5EF4-FFF2-40B4-BE49-F238E27FC236}">
+                    <a16:creationId xmlns:a16="http://schemas.microsoft.com/office/drawing/2014/main" id="{708EB1FB-9C86-5844-8FF3-B0AA2DC166F8}"/>
+                  </a:ext>
+                </a:extLst>
+              </p:cNvPr>
+              <p:cNvSpPr txBox="1"/>
+              <p:nvPr/>
+            </p:nvSpPr>
+            <p:spPr>
+              <a:xfrm>
+                <a:off x="13462180" y="13397847"/>
+                <a:ext cx="1875581" cy="707886"/>
+              </a:xfrm>
+              <a:prstGeom prst="rect">
+                <a:avLst/>
+              </a:prstGeom>
+              <a:noFill/>
+            </p:spPr>
+            <p:txBody>
+              <a:bodyPr wrap="square" rtlCol="0">
+                <a:spAutoFit/>
+              </a:bodyPr>
+              <a:lstStyle/>
+              <a:p>
+                <a14:m>
+                  <m:oMathPara xmlns:m="http://schemas.openxmlformats.org/officeDocument/2006/math">
+                    <m:oMathParaPr>
+                      <m:jc m:val="centerGroup"/>
+                    </m:oMathParaPr>
+                    <m:oMath xmlns:m="http://schemas.openxmlformats.org/officeDocument/2006/math">
+                      <m:r>
+                        <a:rPr lang="en-US" sz="4000" b="0" i="1" smtClean="0">
+                          <a:latin typeface="Cambria Math" panose="02040503050406030204" pitchFamily="18" charset="0"/>
+                        </a:rPr>
+                        <m:t>𝑧</m:t>
+                      </m:r>
+                    </m:oMath>
+                  </m:oMathPara>
+                </a14:m>
+                <a:endParaRPr lang="fr-NL" sz="4000" dirty="0"/>
+              </a:p>
+            </p:txBody>
+          </p:sp>
+        </mc:Choice>
+        <mc:Fallback>
+          <p:sp>
+            <p:nvSpPr>
+              <p:cNvPr id="32" name="ZoneTexte 31">
+                <a:extLst>
+                  <a:ext uri="{FF2B5EF4-FFF2-40B4-BE49-F238E27FC236}">
+                    <a16:creationId xmlns:a16="http://schemas.microsoft.com/office/drawing/2014/main" id="{708EB1FB-9C86-5844-8FF3-B0AA2DC166F8}"/>
+                  </a:ext>
+                </a:extLst>
+              </p:cNvPr>
+              <p:cNvSpPr txBox="1">
+                <a:spLocks noRot="1" noChangeAspect="1" noMove="1" noResize="1" noEditPoints="1" noAdjustHandles="1" noChangeArrowheads="1" noChangeShapeType="1" noTextEdit="1"/>
+              </p:cNvSpPr>
+              <p:nvPr/>
+            </p:nvSpPr>
+            <p:spPr>
+              <a:xfrm>
+                <a:off x="13462180" y="13397847"/>
+                <a:ext cx="1875581" cy="707886"/>
+              </a:xfrm>
+              <a:prstGeom prst="rect">
+                <a:avLst/>
+              </a:prstGeom>
+              <a:blipFill>
+                <a:blip r:embed="rId9"/>
+                <a:stretch>
+                  <a:fillRect/>
+                </a:stretch>
+              </a:blipFill>
+            </p:spPr>
+            <p:txBody>
+              <a:bodyPr/>
+              <a:lstStyle/>
+              <a:p>
+                <a:r>
+                  <a:rPr lang="fr-NL">
+                    <a:noFill/>
+                  </a:rPr>
+                  <a:t> </a:t>
+                </a:r>
+              </a:p>
+            </p:txBody>
+          </p:sp>
+        </mc:Fallback>
+      </mc:AlternateContent>
+      <mc:AlternateContent xmlns:mc="http://schemas.openxmlformats.org/markup-compatibility/2006">
+        <mc:Choice xmlns:a14="http://schemas.microsoft.com/office/drawing/2010/main" Requires="a14">
+          <p:sp>
+            <p:nvSpPr>
+              <p:cNvPr id="33" name="ZoneTexte 32">
+                <a:extLst>
+                  <a:ext uri="{FF2B5EF4-FFF2-40B4-BE49-F238E27FC236}">
+                    <a16:creationId xmlns:a16="http://schemas.microsoft.com/office/drawing/2014/main" id="{C1FCD34A-768E-724F-81F7-59E595DA1E83}"/>
+                  </a:ext>
+                </a:extLst>
+              </p:cNvPr>
+              <p:cNvSpPr txBox="1"/>
+              <p:nvPr/>
+            </p:nvSpPr>
+            <p:spPr>
+              <a:xfrm>
+                <a:off x="12199441" y="7814917"/>
+                <a:ext cx="1875581" cy="707886"/>
+              </a:xfrm>
+              <a:prstGeom prst="rect">
+                <a:avLst/>
+              </a:prstGeom>
+              <a:noFill/>
+            </p:spPr>
+            <p:txBody>
+              <a:bodyPr wrap="square" rtlCol="0">
+                <a:spAutoFit/>
+              </a:bodyPr>
+              <a:lstStyle/>
+              <a:p>
+                <a14:m>
+                  <m:oMathPara xmlns:m="http://schemas.openxmlformats.org/officeDocument/2006/math">
+                    <m:oMathParaPr>
+                      <m:jc m:val="centerGroup"/>
+                    </m:oMathParaPr>
+                    <m:oMath xmlns:m="http://schemas.openxmlformats.org/officeDocument/2006/math">
+                      <m:r>
+                        <a:rPr lang="en-US" sz="4000" b="0" i="1" smtClean="0">
+                          <a:latin typeface="Cambria Math" panose="02040503050406030204" pitchFamily="18" charset="0"/>
+                        </a:rPr>
+                        <m:t>𝑙</m:t>
+                      </m:r>
+                      <m:r>
+                        <a:rPr lang="en-US" sz="4000" b="0" i="1" smtClean="0">
+                          <a:latin typeface="Cambria Math" panose="02040503050406030204" pitchFamily="18" charset="0"/>
+                        </a:rPr>
+                        <m:t>(</m:t>
+                      </m:r>
+                      <m:r>
+                        <a:rPr lang="en-US" sz="4000" b="0" i="1" smtClean="0">
+                          <a:latin typeface="Cambria Math" panose="02040503050406030204" pitchFamily="18" charset="0"/>
+                        </a:rPr>
+                        <m:t>𝑡</m:t>
+                      </m:r>
+                      <m:r>
+                        <a:rPr lang="en-US" sz="4000" b="0" i="1" smtClean="0">
+                          <a:latin typeface="Cambria Math" panose="02040503050406030204" pitchFamily="18" charset="0"/>
+                        </a:rPr>
+                        <m:t>)</m:t>
+                      </m:r>
+                    </m:oMath>
+                  </m:oMathPara>
+                </a14:m>
+                <a:endParaRPr lang="fr-NL" sz="4000" dirty="0"/>
+              </a:p>
+            </p:txBody>
+          </p:sp>
+        </mc:Choice>
+        <mc:Fallback>
+          <p:sp>
+            <p:nvSpPr>
+              <p:cNvPr id="33" name="ZoneTexte 32">
+                <a:extLst>
+                  <a:ext uri="{FF2B5EF4-FFF2-40B4-BE49-F238E27FC236}">
+                    <a16:creationId xmlns:a16="http://schemas.microsoft.com/office/drawing/2014/main" id="{C1FCD34A-768E-724F-81F7-59E595DA1E83}"/>
+                  </a:ext>
+                </a:extLst>
+              </p:cNvPr>
+              <p:cNvSpPr txBox="1">
+                <a:spLocks noRot="1" noChangeAspect="1" noMove="1" noResize="1" noEditPoints="1" noAdjustHandles="1" noChangeArrowheads="1" noChangeShapeType="1" noTextEdit="1"/>
+              </p:cNvSpPr>
+              <p:nvPr/>
+            </p:nvSpPr>
+            <p:spPr>
+              <a:xfrm>
+                <a:off x="12199441" y="7814917"/>
+                <a:ext cx="1875581" cy="707886"/>
+              </a:xfrm>
+              <a:prstGeom prst="rect">
+                <a:avLst/>
+              </a:prstGeom>
+              <a:blipFill>
+                <a:blip r:embed="rId10"/>
+                <a:stretch>
+                  <a:fillRect b="-24561"/>
+                </a:stretch>
+              </a:blipFill>
+            </p:spPr>
+            <p:txBody>
+              <a:bodyPr/>
+              <a:lstStyle/>
+              <a:p>
+                <a:r>
+                  <a:rPr lang="fr-NL">
+                    <a:noFill/>
+                  </a:rPr>
+                  <a:t> </a:t>
+                </a:r>
+              </a:p>
+            </p:txBody>
+          </p:sp>
+        </mc:Fallback>
+      </mc:AlternateContent>
+      <p:sp>
+        <p:nvSpPr>
+          <p:cNvPr id="34" name="Ellipse 33">
+            <a:extLst>
+              <a:ext uri="{FF2B5EF4-FFF2-40B4-BE49-F238E27FC236}">
+                <a16:creationId xmlns:a16="http://schemas.microsoft.com/office/drawing/2014/main" id="{E06EA68E-807D-9047-8460-A8CF7DC3755E}"/>
+              </a:ext>
+            </a:extLst>
+          </p:cNvPr>
+          <p:cNvSpPr/>
+          <p:nvPr/>
+        </p:nvSpPr>
+        <p:spPr>
+          <a:xfrm>
+            <a:off x="12178863" y="11533147"/>
+            <a:ext cx="389790" cy="389790"/>
+          </a:xfrm>
+          <a:prstGeom prst="ellipse">
+            <a:avLst/>
+          </a:prstGeom>
+          <a:solidFill>
+            <a:schemeClr val="tx1"/>
+          </a:solidFill>
+          <a:ln>
+            <a:solidFill>
+              <a:schemeClr val="tx1"/>
+            </a:solidFill>
+          </a:ln>
+        </p:spPr>
+        <p:style>
+          <a:lnRef idx="2">
+            <a:schemeClr val="accent1">
+              <a:shade val="50000"/>
+            </a:schemeClr>
+          </a:lnRef>
+          <a:fillRef idx="1">
+            <a:schemeClr val="accent1"/>
+          </a:fillRef>
+          <a:effectRef idx="0">
+            <a:schemeClr val="accent1"/>
+          </a:effectRef>
+          <a:fontRef idx="minor">
+            <a:schemeClr val="lt1"/>
+          </a:fontRef>
+        </p:style>
+        <p:txBody>
+          <a:bodyPr rtlCol="0" anchor="ctr"/>
+          <a:lstStyle/>
+          <a:p>
+            <a:pPr algn="ctr"/>
+            <a:endParaRPr lang="fr-NL"/>
+          </a:p>
+        </p:txBody>
+      </p:sp>
+      <mc:AlternateContent xmlns:mc="http://schemas.openxmlformats.org/markup-compatibility/2006">
+        <mc:Choice xmlns:a14="http://schemas.microsoft.com/office/drawing/2010/main" Requires="a14">
+          <p:sp>
+            <p:nvSpPr>
+              <p:cNvPr id="35" name="ZoneTexte 34">
+                <a:extLst>
+                  <a:ext uri="{FF2B5EF4-FFF2-40B4-BE49-F238E27FC236}">
+                    <a16:creationId xmlns:a16="http://schemas.microsoft.com/office/drawing/2014/main" id="{C6D38914-2937-0A4A-AB9D-F660F9629571}"/>
+                  </a:ext>
+                </a:extLst>
+              </p:cNvPr>
+              <p:cNvSpPr txBox="1"/>
+              <p:nvPr/>
+            </p:nvSpPr>
+            <p:spPr>
+              <a:xfrm>
+                <a:off x="10271383" y="9045693"/>
+                <a:ext cx="1875581" cy="707886"/>
+              </a:xfrm>
+              <a:prstGeom prst="rect">
+                <a:avLst/>
+              </a:prstGeom>
+              <a:noFill/>
+            </p:spPr>
+            <p:txBody>
+              <a:bodyPr wrap="square" rtlCol="0">
+                <a:spAutoFit/>
+              </a:bodyPr>
+              <a:lstStyle/>
+              <a:p>
+                <a14:m>
+                  <m:oMathPara xmlns:m="http://schemas.openxmlformats.org/officeDocument/2006/math">
+                    <m:oMathParaPr>
+                      <m:jc m:val="centerGroup"/>
+                    </m:oMathParaPr>
+                    <m:oMath xmlns:m="http://schemas.openxmlformats.org/officeDocument/2006/math">
+                      <m:r>
+                        <a:rPr lang="en-US" sz="4000" b="0" i="1" smtClean="0">
+                          <a:latin typeface="Cambria Math" panose="02040503050406030204" pitchFamily="18" charset="0"/>
+                        </a:rPr>
+                        <m:t>(</m:t>
+                      </m:r>
+                      <m:r>
+                        <a:rPr lang="en-US" sz="4000" b="0" i="1" smtClean="0">
+                          <a:latin typeface="Cambria Math" panose="02040503050406030204" pitchFamily="18" charset="0"/>
+                        </a:rPr>
+                        <m:t>𝑥</m:t>
+                      </m:r>
+                      <m:d>
+                        <m:dPr>
+                          <m:ctrlPr>
+                            <a:rPr lang="en-US" sz="4000" b="0" i="1" smtClean="0">
+                              <a:latin typeface="Cambria Math" panose="02040503050406030204" pitchFamily="18" charset="0"/>
+                            </a:rPr>
+                          </m:ctrlPr>
+                        </m:dPr>
+                        <m:e>
+                          <m:r>
+                            <a:rPr lang="en-US" sz="4000" b="0" i="1" smtClean="0">
+                              <a:latin typeface="Cambria Math" panose="02040503050406030204" pitchFamily="18" charset="0"/>
+                            </a:rPr>
+                            <m:t>𝑡</m:t>
+                          </m:r>
+                        </m:e>
+                      </m:d>
+                      <m:r>
+                        <a:rPr lang="en-US" sz="4000" b="0" i="1" smtClean="0">
+                          <a:latin typeface="Cambria Math" panose="02040503050406030204" pitchFamily="18" charset="0"/>
+                        </a:rPr>
+                        <m:t>, </m:t>
+                      </m:r>
+                      <m:r>
+                        <a:rPr lang="en-US" sz="4000" b="0" i="1" smtClean="0">
+                          <a:latin typeface="Cambria Math" panose="02040503050406030204" pitchFamily="18" charset="0"/>
+                        </a:rPr>
+                        <m:t>𝑧</m:t>
+                      </m:r>
+                      <m:r>
+                        <a:rPr lang="en-US" sz="4000" b="0" i="1" smtClean="0">
+                          <a:latin typeface="Cambria Math" panose="02040503050406030204" pitchFamily="18" charset="0"/>
+                        </a:rPr>
+                        <m:t>(</m:t>
+                      </m:r>
+                      <m:r>
+                        <a:rPr lang="en-US" sz="4000" b="0" i="1" smtClean="0">
+                          <a:latin typeface="Cambria Math" panose="02040503050406030204" pitchFamily="18" charset="0"/>
+                        </a:rPr>
+                        <m:t>𝑡</m:t>
+                      </m:r>
+                      <m:r>
+                        <a:rPr lang="en-US" sz="4000" b="0" i="1" smtClean="0">
+                          <a:latin typeface="Cambria Math" panose="02040503050406030204" pitchFamily="18" charset="0"/>
+                        </a:rPr>
+                        <m:t>))</m:t>
+                      </m:r>
+                    </m:oMath>
+                  </m:oMathPara>
+                </a14:m>
+                <a:endParaRPr lang="fr-NL" sz="4000" dirty="0"/>
+              </a:p>
+            </p:txBody>
+          </p:sp>
+        </mc:Choice>
+        <mc:Fallback>
+          <p:sp>
+            <p:nvSpPr>
+              <p:cNvPr id="35" name="ZoneTexte 34">
+                <a:extLst>
+                  <a:ext uri="{FF2B5EF4-FFF2-40B4-BE49-F238E27FC236}">
+                    <a16:creationId xmlns:a16="http://schemas.microsoft.com/office/drawing/2014/main" id="{C6D38914-2937-0A4A-AB9D-F660F9629571}"/>
+                  </a:ext>
+                </a:extLst>
+              </p:cNvPr>
+              <p:cNvSpPr txBox="1">
+                <a:spLocks noRot="1" noChangeAspect="1" noMove="1" noResize="1" noEditPoints="1" noAdjustHandles="1" noChangeArrowheads="1" noChangeShapeType="1" noTextEdit="1"/>
+              </p:cNvSpPr>
+              <p:nvPr/>
+            </p:nvSpPr>
+            <p:spPr>
+              <a:xfrm>
+                <a:off x="10271383" y="9045693"/>
+                <a:ext cx="1875581" cy="707886"/>
+              </a:xfrm>
+              <a:prstGeom prst="rect">
+                <a:avLst/>
+              </a:prstGeom>
+              <a:blipFill>
+                <a:blip r:embed="rId11"/>
+                <a:stretch>
+                  <a:fillRect l="-7383" r="-46309" b="-26786"/>
+                </a:stretch>
+              </a:blipFill>
+            </p:spPr>
+            <p:txBody>
+              <a:bodyPr/>
+              <a:lstStyle/>
+              <a:p>
+                <a:r>
+                  <a:rPr lang="fr-NL">
+                    <a:noFill/>
+                  </a:rPr>
+                  <a:t> </a:t>
+                </a:r>
+              </a:p>
+            </p:txBody>
+          </p:sp>
+        </mc:Fallback>
+      </mc:AlternateContent>
+      <p:cxnSp>
+        <p:nvCxnSpPr>
+          <p:cNvPr id="37" name="Connecteur droit avec flèche 36">
+            <a:extLst>
+              <a:ext uri="{FF2B5EF4-FFF2-40B4-BE49-F238E27FC236}">
+                <a16:creationId xmlns:a16="http://schemas.microsoft.com/office/drawing/2014/main" id="{AFD706F7-59D4-DF4A-BBE8-F07013A13B27}"/>
+              </a:ext>
+            </a:extLst>
+          </p:cNvPr>
+          <p:cNvCxnSpPr>
+            <a:endCxn id="34" idx="0"/>
+          </p:cNvCxnSpPr>
+          <p:nvPr/>
+        </p:nvCxnSpPr>
+        <p:spPr>
+          <a:xfrm>
+            <a:off x="11914311" y="9753579"/>
+            <a:ext cx="459447" cy="1779568"/>
+          </a:xfrm>
+          <a:prstGeom prst="straightConnector1">
+            <a:avLst/>
+          </a:prstGeom>
+          <a:ln w="76200">
+            <a:solidFill>
+              <a:schemeClr val="tx1"/>
+            </a:solidFill>
+            <a:tailEnd type="triangle"/>
+          </a:ln>
+        </p:spPr>
+        <p:style>
+          <a:lnRef idx="1">
+            <a:schemeClr val="accent1"/>
+          </a:lnRef>
+          <a:fillRef idx="0">
+            <a:schemeClr val="accent1"/>
+          </a:fillRef>
+          <a:effectRef idx="0">
+            <a:schemeClr val="accent1"/>
+          </a:effectRef>
+          <a:fontRef idx="minor">
+            <a:schemeClr val="tx1"/>
+          </a:fontRef>
+        </p:style>
+      </p:cxnSp>
+    </p:spTree>
+    <p:extLst>
+      <p:ext uri="{BB962C8B-B14F-4D97-AF65-F5344CB8AC3E}">
+        <p14:creationId xmlns:p14="http://schemas.microsoft.com/office/powerpoint/2010/main" val="3557632820"/>
+      </p:ext>
+    </p:extLst>
+  </p:cSld>
+  <p:clrMapOvr>
+    <a:masterClrMapping/>
+  </p:clrMapOvr>
+  <mc:AlternateContent xmlns:mc="http://schemas.openxmlformats.org/markup-compatibility/2006" xmlns:p159="http://schemas.microsoft.com/office/powerpoint/2015/09/main">
+    <mc:Choice Requires="p159">
+      <p:transition spd="med">
+        <p159:morph option="byObject"/>
+      </p:transition>
+    </mc:Choice>
+    <mc:Fallback xmlns="">
+      <p:transition spd="med">
+        <p:fade/>
+      </p:transition>
     </mc:Fallback>
   </mc:AlternateContent>
 </p:sld>

</xml_diff>